<commit_message>
fixing pptx #1 for new course
</commit_message>
<xml_diff>
--- a/docs/ЛЭТИ ВвПП 2019.1.pptx
+++ b/docs/ЛЭТИ ВвПП 2019.1.pptx
@@ -74,8 +74,8 @@
         </p:nvSpPr>
         <p:spPr>
           <a:xfrm>
-            <a:off x="599040" y="301320"/>
-            <a:ext cx="10797840" cy="1261440"/>
+            <a:off x="599760" y="301320"/>
+            <a:ext cx="10798200" cy="1261800"/>
           </a:xfrm>
           <a:prstGeom prst="rect">
             <a:avLst/>
@@ -104,7 +104,7 @@
         <p:spPr>
           <a:xfrm>
             <a:off x="599760" y="1768680"/>
-            <a:ext cx="10797840" cy="2090880"/>
+            <a:ext cx="10798200" cy="2090880"/>
           </a:xfrm>
           <a:prstGeom prst="rect">
             <a:avLst/>
@@ -134,7 +134,7 @@
         <p:spPr>
           <a:xfrm>
             <a:off x="599760" y="4058640"/>
-            <a:ext cx="10797840" cy="2090880"/>
+            <a:ext cx="10798200" cy="2090880"/>
           </a:xfrm>
           <a:prstGeom prst="rect">
             <a:avLst/>
@@ -185,8 +185,8 @@
         </p:nvSpPr>
         <p:spPr>
           <a:xfrm>
-            <a:off x="599040" y="301320"/>
-            <a:ext cx="10797840" cy="1261440"/>
+            <a:off x="599760" y="301320"/>
+            <a:ext cx="10798200" cy="1261800"/>
           </a:xfrm>
           <a:prstGeom prst="rect">
             <a:avLst/>
@@ -356,8 +356,8 @@
         </p:nvSpPr>
         <p:spPr>
           <a:xfrm>
-            <a:off x="599040" y="301320"/>
-            <a:ext cx="10797840" cy="1261440"/>
+            <a:off x="599760" y="301320"/>
+            <a:ext cx="10798200" cy="1261800"/>
           </a:xfrm>
           <a:prstGeom prst="rect">
             <a:avLst/>
@@ -386,7 +386,7 @@
         <p:spPr>
           <a:xfrm>
             <a:off x="599760" y="1768680"/>
-            <a:ext cx="3476520" cy="2090880"/>
+            <a:ext cx="3476880" cy="2090880"/>
           </a:xfrm>
           <a:prstGeom prst="rect">
             <a:avLst/>
@@ -415,8 +415,8 @@
         </p:nvSpPr>
         <p:spPr>
           <a:xfrm>
-            <a:off x="4250520" y="1768680"/>
-            <a:ext cx="3476520" cy="2090880"/>
+            <a:off x="4250880" y="1768680"/>
+            <a:ext cx="3476880" cy="2090880"/>
           </a:xfrm>
           <a:prstGeom prst="rect">
             <a:avLst/>
@@ -445,8 +445,8 @@
         </p:nvSpPr>
         <p:spPr>
           <a:xfrm>
-            <a:off x="7901280" y="1768680"/>
-            <a:ext cx="3476520" cy="2090880"/>
+            <a:off x="7902000" y="1768680"/>
+            <a:ext cx="3476880" cy="2090880"/>
           </a:xfrm>
           <a:prstGeom prst="rect">
             <a:avLst/>
@@ -476,7 +476,7 @@
         <p:spPr>
           <a:xfrm>
             <a:off x="599760" y="4058640"/>
-            <a:ext cx="3476520" cy="2090880"/>
+            <a:ext cx="3476880" cy="2090880"/>
           </a:xfrm>
           <a:prstGeom prst="rect">
             <a:avLst/>
@@ -505,8 +505,8 @@
         </p:nvSpPr>
         <p:spPr>
           <a:xfrm>
-            <a:off x="4250520" y="4058640"/>
-            <a:ext cx="3476520" cy="2090880"/>
+            <a:off x="4250880" y="4058640"/>
+            <a:ext cx="3476880" cy="2090880"/>
           </a:xfrm>
           <a:prstGeom prst="rect">
             <a:avLst/>
@@ -535,8 +535,8 @@
         </p:nvSpPr>
         <p:spPr>
           <a:xfrm>
-            <a:off x="7901280" y="4058640"/>
-            <a:ext cx="3476520" cy="2090880"/>
+            <a:off x="7902000" y="4058640"/>
+            <a:ext cx="3476880" cy="2090880"/>
           </a:xfrm>
           <a:prstGeom prst="rect">
             <a:avLst/>
@@ -587,8 +587,8 @@
         </p:nvSpPr>
         <p:spPr>
           <a:xfrm>
-            <a:off x="599040" y="301320"/>
-            <a:ext cx="10797840" cy="1261440"/>
+            <a:off x="599760" y="301320"/>
+            <a:ext cx="10798200" cy="1261800"/>
           </a:xfrm>
           <a:prstGeom prst="rect">
             <a:avLst/>
@@ -617,7 +617,7 @@
         <p:spPr>
           <a:xfrm>
             <a:off x="599760" y="1768680"/>
-            <a:ext cx="10797840" cy="4383720"/>
+            <a:ext cx="10798200" cy="4384080"/>
           </a:xfrm>
           <a:prstGeom prst="rect">
             <a:avLst/>
@@ -667,8 +667,8 @@
         </p:nvSpPr>
         <p:spPr>
           <a:xfrm>
-            <a:off x="599040" y="301320"/>
-            <a:ext cx="10797840" cy="1261440"/>
+            <a:off x="599760" y="301320"/>
+            <a:ext cx="10798200" cy="1261800"/>
           </a:xfrm>
           <a:prstGeom prst="rect">
             <a:avLst/>
@@ -697,7 +697,7 @@
         <p:spPr>
           <a:xfrm>
             <a:off x="599760" y="1768680"/>
-            <a:ext cx="10797840" cy="4383720"/>
+            <a:ext cx="10798200" cy="4384080"/>
           </a:xfrm>
           <a:prstGeom prst="rect">
             <a:avLst/>
@@ -748,8 +748,8 @@
         </p:nvSpPr>
         <p:spPr>
           <a:xfrm>
-            <a:off x="599040" y="301320"/>
-            <a:ext cx="10797840" cy="1261440"/>
+            <a:off x="599760" y="301320"/>
+            <a:ext cx="10798200" cy="1261800"/>
           </a:xfrm>
           <a:prstGeom prst="rect">
             <a:avLst/>
@@ -778,7 +778,7 @@
         <p:spPr>
           <a:xfrm>
             <a:off x="599760" y="1768680"/>
-            <a:ext cx="5269320" cy="4383720"/>
+            <a:ext cx="5269320" cy="4384080"/>
           </a:xfrm>
           <a:prstGeom prst="rect">
             <a:avLst/>
@@ -808,7 +808,7 @@
         <p:spPr>
           <a:xfrm>
             <a:off x="6132960" y="1768680"/>
-            <a:ext cx="5269320" cy="4383720"/>
+            <a:ext cx="5269320" cy="4384080"/>
           </a:xfrm>
           <a:prstGeom prst="rect">
             <a:avLst/>
@@ -859,8 +859,8 @@
         </p:nvSpPr>
         <p:spPr>
           <a:xfrm>
-            <a:off x="599040" y="301320"/>
-            <a:ext cx="10797840" cy="1261440"/>
+            <a:off x="599760" y="301320"/>
+            <a:ext cx="10798200" cy="1261800"/>
           </a:xfrm>
           <a:prstGeom prst="rect">
             <a:avLst/>
@@ -910,8 +910,8 @@
         </p:nvSpPr>
         <p:spPr>
           <a:xfrm>
-            <a:off x="599040" y="301320"/>
-            <a:ext cx="10797840" cy="5848560"/>
+            <a:off x="599760" y="301320"/>
+            <a:ext cx="10798200" cy="5850360"/>
           </a:xfrm>
           <a:prstGeom prst="rect">
             <a:avLst/>
@@ -961,8 +961,8 @@
         </p:nvSpPr>
         <p:spPr>
           <a:xfrm>
-            <a:off x="599040" y="301320"/>
-            <a:ext cx="10797840" cy="1261440"/>
+            <a:off x="599760" y="301320"/>
+            <a:ext cx="10798200" cy="1261800"/>
           </a:xfrm>
           <a:prstGeom prst="rect">
             <a:avLst/>
@@ -1021,7 +1021,7 @@
         <p:spPr>
           <a:xfrm>
             <a:off x="6132960" y="1768680"/>
-            <a:ext cx="5269320" cy="4383720"/>
+            <a:ext cx="5269320" cy="4384080"/>
           </a:xfrm>
           <a:prstGeom prst="rect">
             <a:avLst/>
@@ -1102,8 +1102,8 @@
         </p:nvSpPr>
         <p:spPr>
           <a:xfrm>
-            <a:off x="599040" y="301320"/>
-            <a:ext cx="10797840" cy="1261440"/>
+            <a:off x="599760" y="301320"/>
+            <a:ext cx="10798200" cy="1261800"/>
           </a:xfrm>
           <a:prstGeom prst="rect">
             <a:avLst/>
@@ -1132,7 +1132,7 @@
         <p:spPr>
           <a:xfrm>
             <a:off x="599760" y="1768680"/>
-            <a:ext cx="5269320" cy="4383720"/>
+            <a:ext cx="5269320" cy="4384080"/>
           </a:xfrm>
           <a:prstGeom prst="rect">
             <a:avLst/>
@@ -1243,8 +1243,8 @@
         </p:nvSpPr>
         <p:spPr>
           <a:xfrm>
-            <a:off x="599040" y="301320"/>
-            <a:ext cx="10797840" cy="1261440"/>
+            <a:off x="599760" y="301320"/>
+            <a:ext cx="10798200" cy="1261800"/>
           </a:xfrm>
           <a:prstGeom prst="rect">
             <a:avLst/>
@@ -1333,7 +1333,7 @@
         <p:spPr>
           <a:xfrm>
             <a:off x="599760" y="4058640"/>
-            <a:ext cx="10797840" cy="2090880"/>
+            <a:ext cx="10798200" cy="2090880"/>
           </a:xfrm>
           <a:prstGeom prst="rect">
             <a:avLst/>
@@ -1394,8 +1394,8 @@
         </p:nvSpPr>
         <p:spPr>
           <a:xfrm>
-            <a:off x="599040" y="301320"/>
-            <a:ext cx="10797840" cy="1261440"/>
+            <a:off x="599760" y="301320"/>
+            <a:ext cx="10798200" cy="1261800"/>
           </a:xfrm>
           <a:prstGeom prst="rect">
             <a:avLst/>
@@ -1404,13 +1404,14 @@
         <p:txBody>
           <a:bodyPr lIns="0" rIns="0" tIns="0" bIns="0" anchor="ctr"/>
           <a:p>
-            <a:r>
-              <a:rPr b="0" lang="ru-RU" sz="1800" spc="-1" strike="noStrike">
+            <a:pPr algn="ctr"/>
+            <a:r>
+              <a:rPr b="0" lang="ru-RU" sz="4400" spc="-1" strike="noStrike">
                 <a:latin typeface="Arial"/>
               </a:rPr>
               <a:t>Для правки текста заглавия щёлкните мышью</a:t>
             </a:r>
-            <a:endParaRPr b="0" lang="ru-RU" sz="1800" spc="-1" strike="noStrike">
+            <a:endParaRPr b="0" lang="ru-RU" sz="4400" spc="-1" strike="noStrike">
               <a:latin typeface="Arial"/>
             </a:endParaRPr>
           </a:p>
@@ -1429,7 +1430,7 @@
         <p:spPr>
           <a:xfrm>
             <a:off x="599760" y="1768680"/>
-            <a:ext cx="10797840" cy="4383720"/>
+            <a:ext cx="10798200" cy="4384080"/>
           </a:xfrm>
           <a:prstGeom prst="rect">
             <a:avLst/>
@@ -1452,12 +1453,12 @@
               <a:buChar char=""/>
             </a:pPr>
             <a:r>
-              <a:rPr b="0" lang="ru-RU" sz="1800" spc="-1" strike="noStrike">
+              <a:rPr b="0" lang="ru-RU" sz="3200" spc="-1" strike="noStrike">
                 <a:latin typeface="Arial"/>
               </a:rPr>
               <a:t>Для правки структуры щёлкните мышью</a:t>
             </a:r>
-            <a:endParaRPr b="0" lang="ru-RU" sz="1800" spc="-1" strike="noStrike">
+            <a:endParaRPr b="0" lang="ru-RU" sz="3200" spc="-1" strike="noStrike">
               <a:latin typeface="Arial"/>
             </a:endParaRPr>
           </a:p>
@@ -1474,12 +1475,12 @@
               <a:buChar char=""/>
             </a:pPr>
             <a:r>
-              <a:rPr b="0" lang="ru-RU" sz="1800" spc="-1" strike="noStrike">
+              <a:rPr b="0" lang="ru-RU" sz="2800" spc="-1" strike="noStrike">
                 <a:latin typeface="Arial"/>
               </a:rPr>
               <a:t>Второй уровень структуры</a:t>
             </a:r>
-            <a:endParaRPr b="0" lang="ru-RU" sz="1800" spc="-1" strike="noStrike">
+            <a:endParaRPr b="0" lang="ru-RU" sz="2800" spc="-1" strike="noStrike">
               <a:latin typeface="Arial"/>
             </a:endParaRPr>
           </a:p>
@@ -1496,12 +1497,12 @@
               <a:buChar char=""/>
             </a:pPr>
             <a:r>
-              <a:rPr b="0" lang="ru-RU" sz="1800" spc="-1" strike="noStrike">
+              <a:rPr b="0" lang="ru-RU" sz="2400" spc="-1" strike="noStrike">
                 <a:latin typeface="Arial"/>
               </a:rPr>
               <a:t>Третий уровень структуры</a:t>
             </a:r>
-            <a:endParaRPr b="0" lang="ru-RU" sz="1800" spc="-1" strike="noStrike">
+            <a:endParaRPr b="0" lang="ru-RU" sz="2400" spc="-1" strike="noStrike">
               <a:latin typeface="Arial"/>
             </a:endParaRPr>
           </a:p>
@@ -1518,12 +1519,12 @@
               <a:buChar char=""/>
             </a:pPr>
             <a:r>
-              <a:rPr b="0" lang="ru-RU" sz="1800" spc="-1" strike="noStrike">
+              <a:rPr b="0" lang="ru-RU" sz="2000" spc="-1" strike="noStrike">
                 <a:latin typeface="Arial"/>
               </a:rPr>
               <a:t>Четвёртый уровень структуры</a:t>
             </a:r>
-            <a:endParaRPr b="0" lang="ru-RU" sz="1800" spc="-1" strike="noStrike">
+            <a:endParaRPr b="0" lang="ru-RU" sz="2000" spc="-1" strike="noStrike">
               <a:latin typeface="Arial"/>
             </a:endParaRPr>
           </a:p>
@@ -1540,12 +1541,12 @@
               <a:buChar char=""/>
             </a:pPr>
             <a:r>
-              <a:rPr b="0" lang="ru-RU" sz="1800" spc="-1" strike="noStrike">
+              <a:rPr b="0" lang="ru-RU" sz="2000" spc="-1" strike="noStrike">
                 <a:latin typeface="Arial"/>
               </a:rPr>
               <a:t>Пятый уровень структуры</a:t>
             </a:r>
-            <a:endParaRPr b="0" lang="ru-RU" sz="1800" spc="-1" strike="noStrike">
+            <a:endParaRPr b="0" lang="ru-RU" sz="2000" spc="-1" strike="noStrike">
               <a:latin typeface="Arial"/>
             </a:endParaRPr>
           </a:p>
@@ -1562,12 +1563,12 @@
               <a:buChar char=""/>
             </a:pPr>
             <a:r>
-              <a:rPr b="0" lang="ru-RU" sz="1800" spc="-1" strike="noStrike">
+              <a:rPr b="0" lang="ru-RU" sz="2000" spc="-1" strike="noStrike">
                 <a:latin typeface="Arial"/>
               </a:rPr>
               <a:t>Шестой уровень структуры</a:t>
             </a:r>
-            <a:endParaRPr b="0" lang="ru-RU" sz="1800" spc="-1" strike="noStrike">
+            <a:endParaRPr b="0" lang="ru-RU" sz="2000" spc="-1" strike="noStrike">
               <a:latin typeface="Arial"/>
             </a:endParaRPr>
           </a:p>
@@ -1584,12 +1585,12 @@
               <a:buChar char=""/>
             </a:pPr>
             <a:r>
-              <a:rPr b="0" lang="ru-RU" sz="1800" spc="-1" strike="noStrike">
+              <a:rPr b="0" lang="ru-RU" sz="2000" spc="-1" strike="noStrike">
                 <a:latin typeface="Arial"/>
               </a:rPr>
               <a:t>Седьмой уровень структуры</a:t>
             </a:r>
-            <a:endParaRPr b="0" lang="ru-RU" sz="1800" spc="-1" strike="noStrike">
+            <a:endParaRPr b="0" lang="ru-RU" sz="2000" spc="-1" strike="noStrike">
               <a:latin typeface="Arial"/>
             </a:endParaRPr>
           </a:p>
@@ -1641,7 +1642,7 @@
         <p:spPr>
           <a:xfrm>
             <a:off x="548640" y="301320"/>
-            <a:ext cx="10797840" cy="4452840"/>
+            <a:ext cx="10797480" cy="4452480"/>
           </a:xfrm>
           <a:prstGeom prst="rect">
             <a:avLst/>
@@ -1670,7 +1671,7 @@
                 <a:latin typeface="Source Sans Pro Light"/>
                 <a:ea typeface="DejaVu Sans"/>
               </a:rPr>
-              <a:t>Введение в промышленное программирование .NET</a:t>
+              <a:t>Основы разработки корпоративных систем на платформе .NET</a:t>
             </a:r>
             <a:endParaRPr b="0" lang="ru-RU" sz="8000" spc="-1" strike="noStrike">
               <a:latin typeface="Arial"/>
@@ -1687,7 +1688,7 @@
         <p:spPr>
           <a:xfrm>
             <a:off x="552960" y="5216400"/>
-            <a:ext cx="10789200" cy="1549440"/>
+            <a:ext cx="10788840" cy="1549080"/>
           </a:xfrm>
           <a:prstGeom prst="rect">
             <a:avLst/>
@@ -1788,14 +1789,14 @@
       </p:grpSpPr>
       <p:sp>
         <p:nvSpPr>
-          <p:cNvPr id="65" name="TextShape 1"/>
-          <p:cNvSpPr txBox="1"/>
+          <p:cNvPr id="65" name="CustomShape 1"/>
+          <p:cNvSpPr/>
           <p:nvPr/>
         </p:nvSpPr>
         <p:spPr>
           <a:xfrm>
             <a:off x="578160" y="34560"/>
-            <a:ext cx="10797840" cy="1261440"/>
+            <a:ext cx="10797480" cy="1261080"/>
           </a:xfrm>
           <a:prstGeom prst="rect">
             <a:avLst/>
@@ -1805,10 +1806,20 @@
             <a:noFill/>
           </a:ln>
         </p:spPr>
+        <p:style>
+          <a:lnRef idx="0"/>
+          <a:fillRef idx="0"/>
+          <a:effectRef idx="0"/>
+          <a:fontRef idx="minor"/>
+        </p:style>
         <p:txBody>
           <a:bodyPr lIns="0" rIns="0" tIns="0" bIns="0" anchor="ctr"/>
           <a:p>
-            <a:pPr algn="ctr"/>
+            <a:pPr algn="ctr">
+              <a:lnSpc>
+                <a:spcPct val="100000"/>
+              </a:lnSpc>
+            </a:pPr>
             <a:r>
               <a:rPr b="0" lang="ru-RU" sz="4400" spc="-1" strike="noStrike">
                 <a:latin typeface="Arial"/>
@@ -1823,14 +1834,14 @@
       </p:sp>
       <p:sp>
         <p:nvSpPr>
-          <p:cNvPr id="66" name="TextShape 2"/>
-          <p:cNvSpPr txBox="1"/>
+          <p:cNvPr id="66" name="CustomShape 2"/>
+          <p:cNvSpPr/>
           <p:nvPr/>
         </p:nvSpPr>
         <p:spPr>
           <a:xfrm>
             <a:off x="578160" y="921600"/>
-            <a:ext cx="6801120" cy="3775320"/>
+            <a:ext cx="6800760" cy="3774960"/>
           </a:xfrm>
           <a:prstGeom prst="rect">
             <a:avLst/>
@@ -1840,10 +1851,16 @@
             <a:noFill/>
           </a:ln>
         </p:spPr>
+        <p:style>
+          <a:lnRef idx="0"/>
+          <a:fillRef idx="0"/>
+          <a:effectRef idx="0"/>
+          <a:fontRef idx="minor"/>
+        </p:style>
         <p:txBody>
           <a:bodyPr lIns="90000" rIns="90000" tIns="45000" bIns="45000"/>
           <a:p>
-            <a:pPr marL="216000" indent="-216000">
+            <a:pPr marL="216000" indent="-215640">
               <a:lnSpc>
                 <a:spcPct val="100000"/>
               </a:lnSpc>
@@ -1873,7 +1890,7 @@
             </a:endParaRPr>
           </a:p>
           <a:p>
-            <a:pPr marL="216000" indent="-216000">
+            <a:pPr marL="216000" indent="-215640">
               <a:lnSpc>
                 <a:spcPct val="100000"/>
               </a:lnSpc>
@@ -1903,7 +1920,7 @@
             </a:endParaRPr>
           </a:p>
           <a:p>
-            <a:pPr marL="216000" indent="-216000">
+            <a:pPr marL="216000" indent="-215640">
               <a:lnSpc>
                 <a:spcPct val="100000"/>
               </a:lnSpc>
@@ -1933,7 +1950,7 @@
             </a:endParaRPr>
           </a:p>
           <a:p>
-            <a:pPr marL="216000" indent="-216000">
+            <a:pPr marL="216000" indent="-215640">
               <a:lnSpc>
                 <a:spcPct val="100000"/>
               </a:lnSpc>
@@ -1963,7 +1980,7 @@
             </a:endParaRPr>
           </a:p>
           <a:p>
-            <a:pPr marL="216000" indent="-216000">
+            <a:pPr marL="216000" indent="-215640">
               <a:lnSpc>
                 <a:spcPct val="100000"/>
               </a:lnSpc>
@@ -1993,7 +2010,7 @@
             </a:endParaRPr>
           </a:p>
           <a:p>
-            <a:pPr marL="216000" indent="-216000">
+            <a:pPr marL="216000" indent="-215640">
               <a:lnSpc>
                 <a:spcPct val="100000"/>
               </a:lnSpc>
@@ -2023,7 +2040,7 @@
             </a:endParaRPr>
           </a:p>
           <a:p>
-            <a:pPr marL="216000" indent="-216000">
+            <a:pPr marL="216000" indent="-215640">
               <a:lnSpc>
                 <a:spcPct val="100000"/>
               </a:lnSpc>
@@ -2053,7 +2070,23 @@
             </a:endParaRPr>
           </a:p>
           <a:p>
-            <a:pPr marL="216000" indent="-216000">
+            <a:pPr>
+              <a:lnSpc>
+                <a:spcPct val="100000"/>
+              </a:lnSpc>
+              <a:spcBef>
+                <a:spcPts val="451"/>
+              </a:spcBef>
+              <a:spcAft>
+                <a:spcPts val="451"/>
+              </a:spcAft>
+            </a:pPr>
+            <a:endParaRPr b="0" lang="ru-RU" sz="1500" spc="-1" strike="noStrike">
+              <a:latin typeface="Arial"/>
+            </a:endParaRPr>
+          </a:p>
+          <a:p>
+            <a:pPr marL="216000" indent="-215640">
               <a:lnSpc>
                 <a:spcPct val="100000"/>
               </a:lnSpc>
@@ -2069,12 +2102,21 @@
               <a:buFont typeface="StarSymbol"/>
               <a:buAutoNum type="arabicParenR"/>
             </a:pPr>
-            <a:endParaRPr b="0" lang="ru-RU" sz="1500" spc="-1" strike="noStrike">
-              <a:latin typeface="Arial"/>
-            </a:endParaRPr>
-          </a:p>
-          <a:p>
-            <a:pPr marL="216000" indent="-216000">
+            <a:r>
+              <a:rPr b="0" lang="ru-RU" sz="1500" spc="-1" strike="noStrike">
+                <a:solidFill>
+                  <a:srgbClr val="000000"/>
+                </a:solidFill>
+                <a:latin typeface="Open Sans"/>
+              </a:rPr>
+              <a:t>50 баллов — 3</a:t>
+            </a:r>
+            <a:endParaRPr b="0" lang="ru-RU" sz="1500" spc="-1" strike="noStrike">
+              <a:latin typeface="Arial"/>
+            </a:endParaRPr>
+          </a:p>
+          <a:p>
+            <a:pPr marL="216000" indent="-215640">
               <a:lnSpc>
                 <a:spcPct val="100000"/>
               </a:lnSpc>
@@ -2097,14 +2139,14 @@
                 </a:solidFill>
                 <a:latin typeface="Open Sans"/>
               </a:rPr>
-              <a:t>50 баллов — 3</a:t>
-            </a:r>
-            <a:endParaRPr b="0" lang="ru-RU" sz="1500" spc="-1" strike="noStrike">
-              <a:latin typeface="Arial"/>
-            </a:endParaRPr>
-          </a:p>
-          <a:p>
-            <a:pPr marL="216000" indent="-216000">
+              <a:t>65 баллов — 4</a:t>
+            </a:r>
+            <a:endParaRPr b="0" lang="ru-RU" sz="1500" spc="-1" strike="noStrike">
+              <a:latin typeface="Arial"/>
+            </a:endParaRPr>
+          </a:p>
+          <a:p>
+            <a:pPr marL="216000" indent="-215640">
               <a:lnSpc>
                 <a:spcPct val="100000"/>
               </a:lnSpc>
@@ -2127,36 +2169,6 @@
                 </a:solidFill>
                 <a:latin typeface="Open Sans"/>
               </a:rPr>
-              <a:t>65 баллов — 4</a:t>
-            </a:r>
-            <a:endParaRPr b="0" lang="ru-RU" sz="1500" spc="-1" strike="noStrike">
-              <a:latin typeface="Arial"/>
-            </a:endParaRPr>
-          </a:p>
-          <a:p>
-            <a:pPr marL="216000" indent="-216000">
-              <a:lnSpc>
-                <a:spcPct val="100000"/>
-              </a:lnSpc>
-              <a:spcBef>
-                <a:spcPts val="451"/>
-              </a:spcBef>
-              <a:spcAft>
-                <a:spcPts val="451"/>
-              </a:spcAft>
-              <a:buClr>
-                <a:srgbClr val="000000"/>
-              </a:buClr>
-              <a:buFont typeface="StarSymbol"/>
-              <a:buAutoNum type="arabicParenR"/>
-            </a:pPr>
-            <a:r>
-              <a:rPr b="0" lang="ru-RU" sz="1500" spc="-1" strike="noStrike">
-                <a:solidFill>
-                  <a:srgbClr val="000000"/>
-                </a:solidFill>
-                <a:latin typeface="Open Sans"/>
-              </a:rPr>
               <a:t>80 баллов — 5</a:t>
             </a:r>
             <a:endParaRPr b="0" lang="ru-RU" sz="1500" spc="-1" strike="noStrike">
@@ -2167,14 +2179,14 @@
       </p:sp>
       <p:sp>
         <p:nvSpPr>
-          <p:cNvPr id="67" name="TextShape 3"/>
-          <p:cNvSpPr txBox="1"/>
+          <p:cNvPr id="67" name="CustomShape 3"/>
+          <p:cNvSpPr/>
           <p:nvPr/>
         </p:nvSpPr>
         <p:spPr>
           <a:xfrm>
             <a:off x="360000" y="5400000"/>
-            <a:ext cx="10797840" cy="1261440"/>
+            <a:ext cx="10797480" cy="1261080"/>
           </a:xfrm>
           <a:prstGeom prst="rect">
             <a:avLst/>
@@ -2184,6 +2196,12 @@
             <a:noFill/>
           </a:ln>
         </p:spPr>
+        <p:style>
+          <a:lnRef idx="0"/>
+          <a:fillRef idx="0"/>
+          <a:effectRef idx="0"/>
+          <a:fontRef idx="minor"/>
+        </p:style>
         <p:txBody>
           <a:bodyPr lIns="0" rIns="0" tIns="0" bIns="0" anchor="ctr"/>
           <a:p>
@@ -2191,7 +2209,7 @@
               <a:rPr b="0" lang="ru-RU" sz="2800" spc="-1" strike="noStrike">
                 <a:latin typeface="Arial"/>
               </a:rPr>
-              <a:t>Введение в промышленное программирование</a:t>
+              <a:t>Основы разработки корпоративных систем на платформе .NET</a:t>
             </a:r>
             <a:endParaRPr b="0" lang="ru-RU" sz="2800" spc="-1" strike="noStrike">
               <a:latin typeface="Arial"/>
@@ -2250,14 +2268,14 @@
       </p:grpSpPr>
       <p:sp>
         <p:nvSpPr>
-          <p:cNvPr id="68" name="TextShape 1"/>
-          <p:cNvSpPr txBox="1"/>
+          <p:cNvPr id="68" name="CustomShape 1"/>
+          <p:cNvSpPr/>
           <p:nvPr/>
         </p:nvSpPr>
         <p:spPr>
           <a:xfrm>
             <a:off x="578160" y="34560"/>
-            <a:ext cx="10797840" cy="1261440"/>
+            <a:ext cx="10797480" cy="1261080"/>
           </a:xfrm>
           <a:prstGeom prst="rect">
             <a:avLst/>
@@ -2267,10 +2285,20 @@
             <a:noFill/>
           </a:ln>
         </p:spPr>
+        <p:style>
+          <a:lnRef idx="0"/>
+          <a:fillRef idx="0"/>
+          <a:effectRef idx="0"/>
+          <a:fontRef idx="minor"/>
+        </p:style>
         <p:txBody>
           <a:bodyPr lIns="0" rIns="0" tIns="0" bIns="0" anchor="ctr"/>
           <a:p>
-            <a:pPr algn="ctr"/>
+            <a:pPr algn="ctr">
+              <a:lnSpc>
+                <a:spcPct val="100000"/>
+              </a:lnSpc>
+            </a:pPr>
             <a:r>
               <a:rPr b="0" lang="ru-RU" sz="4400" spc="-1" strike="noStrike">
                 <a:latin typeface="Arial"/>
@@ -2285,14 +2313,14 @@
       </p:sp>
       <p:sp>
         <p:nvSpPr>
-          <p:cNvPr id="69" name="TextShape 2"/>
-          <p:cNvSpPr txBox="1"/>
+          <p:cNvPr id="69" name="CustomShape 2"/>
+          <p:cNvSpPr/>
           <p:nvPr/>
         </p:nvSpPr>
         <p:spPr>
           <a:xfrm>
             <a:off x="360000" y="5400000"/>
-            <a:ext cx="10797840" cy="1261440"/>
+            <a:ext cx="10797480" cy="1261080"/>
           </a:xfrm>
           <a:prstGeom prst="rect">
             <a:avLst/>
@@ -2302,6 +2330,12 @@
             <a:noFill/>
           </a:ln>
         </p:spPr>
+        <p:style>
+          <a:lnRef idx="0"/>
+          <a:fillRef idx="0"/>
+          <a:effectRef idx="0"/>
+          <a:fontRef idx="minor"/>
+        </p:style>
         <p:txBody>
           <a:bodyPr lIns="0" rIns="0" tIns="0" bIns="0" anchor="ctr"/>
           <a:p>
@@ -2309,7 +2343,7 @@
               <a:rPr b="0" lang="ru-RU" sz="2800" spc="-1" strike="noStrike">
                 <a:latin typeface="Arial"/>
               </a:rPr>
-              <a:t>Введение в промышленное программирование</a:t>
+              <a:t>Основы разработки корпоративных систем на платформе .NET</a:t>
             </a:r>
             <a:endParaRPr b="0" lang="ru-RU" sz="2800" spc="-1" strike="noStrike">
               <a:latin typeface="Arial"/>
@@ -2319,14 +2353,14 @@
       </p:sp>
       <p:sp>
         <p:nvSpPr>
-          <p:cNvPr id="70" name="TextShape 3"/>
-          <p:cNvSpPr txBox="1"/>
+          <p:cNvPr id="70" name="CustomShape 3"/>
+          <p:cNvSpPr/>
           <p:nvPr/>
         </p:nvSpPr>
         <p:spPr>
           <a:xfrm>
-            <a:off x="936000" y="1244520"/>
-            <a:ext cx="6470280" cy="3796200"/>
+            <a:off x="802080" y="1152000"/>
+            <a:ext cx="6469920" cy="3795840"/>
           </a:xfrm>
           <a:prstGeom prst="rect">
             <a:avLst/>
@@ -2336,10 +2370,16 @@
             <a:noFill/>
           </a:ln>
         </p:spPr>
+        <p:style>
+          <a:lnRef idx="0"/>
+          <a:fillRef idx="0"/>
+          <a:effectRef idx="0"/>
+          <a:fontRef idx="minor"/>
+        </p:style>
         <p:txBody>
           <a:bodyPr lIns="90000" rIns="90000" tIns="45000" bIns="45000"/>
           <a:p>
-            <a:pPr marL="216000" indent="-216000">
+            <a:pPr marL="216000" indent="-215640">
               <a:lnSpc>
                 <a:spcPct val="100000"/>
               </a:lnSpc>
@@ -2370,7 +2410,7 @@
             </a:endParaRPr>
           </a:p>
           <a:p>
-            <a:pPr marL="216000" indent="-216000">
+            <a:pPr marL="216000" indent="-215640">
               <a:lnSpc>
                 <a:spcPct val="100000"/>
               </a:lnSpc>
@@ -2401,7 +2441,7 @@
             </a:endParaRPr>
           </a:p>
           <a:p>
-            <a:pPr marL="216000" indent="-216000">
+            <a:pPr marL="216000" indent="-215640">
               <a:lnSpc>
                 <a:spcPct val="100000"/>
               </a:lnSpc>
@@ -2431,7 +2471,7 @@
             </a:endParaRPr>
           </a:p>
           <a:p>
-            <a:pPr marL="216000" indent="-216000">
+            <a:pPr marL="216000" indent="-215640">
               <a:lnSpc>
                 <a:spcPct val="100000"/>
               </a:lnSpc>
@@ -2461,7 +2501,7 @@
             </a:endParaRPr>
           </a:p>
           <a:p>
-            <a:pPr marL="216000" indent="-216000">
+            <a:pPr marL="216000" indent="-215640">
               <a:lnSpc>
                 <a:spcPct val="100000"/>
               </a:lnSpc>
@@ -2491,7 +2531,7 @@
             </a:endParaRPr>
           </a:p>
           <a:p>
-            <a:pPr marL="216000" indent="-216000">
+            <a:pPr marL="216000" indent="-215640">
               <a:lnSpc>
                 <a:spcPct val="100000"/>
               </a:lnSpc>
@@ -2521,7 +2561,7 @@
             </a:endParaRPr>
           </a:p>
           <a:p>
-            <a:pPr marL="216000" indent="-216000">
+            <a:pPr marL="216000" indent="-215640">
               <a:lnSpc>
                 <a:spcPct val="100000"/>
               </a:lnSpc>
@@ -2552,7 +2592,7 @@
             </a:endParaRPr>
           </a:p>
           <a:p>
-            <a:pPr marL="216000" indent="-216000">
+            <a:pPr marL="216000" indent="-215640">
               <a:lnSpc>
                 <a:spcPct val="100000"/>
               </a:lnSpc>
@@ -2582,7 +2622,7 @@
             </a:endParaRPr>
           </a:p>
           <a:p>
-            <a:pPr marL="216000" indent="-216000">
+            <a:pPr marL="216000" indent="-215640">
               <a:lnSpc>
                 <a:spcPct val="100000"/>
               </a:lnSpc>
@@ -2612,7 +2652,7 @@
             </a:endParaRPr>
           </a:p>
           <a:p>
-            <a:pPr marL="216000" indent="-216000">
+            <a:pPr marL="216000" indent="-215640">
               <a:lnSpc>
                 <a:spcPct val="150000"/>
               </a:lnSpc>
@@ -2688,14 +2728,14 @@
       </p:grpSpPr>
       <p:sp>
         <p:nvSpPr>
-          <p:cNvPr id="71" name="TextShape 1"/>
-          <p:cNvSpPr txBox="1"/>
+          <p:cNvPr id="71" name="CustomShape 1"/>
+          <p:cNvSpPr/>
           <p:nvPr/>
         </p:nvSpPr>
         <p:spPr>
           <a:xfrm>
             <a:off x="576000" y="1800000"/>
-            <a:ext cx="10797840" cy="1261440"/>
+            <a:ext cx="10797480" cy="1261080"/>
           </a:xfrm>
           <a:prstGeom prst="rect">
             <a:avLst/>
@@ -2705,10 +2745,20 @@
             <a:noFill/>
           </a:ln>
         </p:spPr>
+        <p:style>
+          <a:lnRef idx="0"/>
+          <a:fillRef idx="0"/>
+          <a:effectRef idx="0"/>
+          <a:fontRef idx="minor"/>
+        </p:style>
         <p:txBody>
           <a:bodyPr lIns="0" rIns="0" tIns="0" bIns="0" anchor="ctr"/>
           <a:p>
-            <a:pPr algn="ctr"/>
+            <a:pPr algn="ctr">
+              <a:lnSpc>
+                <a:spcPct val="100000"/>
+              </a:lnSpc>
+            </a:pPr>
             <a:r>
               <a:rPr b="0" lang="ru-RU" sz="4400" spc="-1" strike="noStrike">
                 <a:latin typeface="Arial"/>
@@ -2772,14 +2822,14 @@
       </p:grpSpPr>
       <p:sp>
         <p:nvSpPr>
-          <p:cNvPr id="40" name="TextShape 1"/>
-          <p:cNvSpPr txBox="1"/>
+          <p:cNvPr id="40" name="CustomShape 1"/>
+          <p:cNvSpPr/>
           <p:nvPr/>
         </p:nvSpPr>
         <p:spPr>
           <a:xfrm>
-            <a:off x="578160" y="34560"/>
-            <a:ext cx="10797840" cy="1261440"/>
+            <a:off x="521280" y="921600"/>
+            <a:ext cx="6800760" cy="4123800"/>
           </a:xfrm>
           <a:prstGeom prst="rect">
             <a:avLst/>
@@ -2789,32 +2839,329 @@
             <a:noFill/>
           </a:ln>
         </p:spPr>
-        <p:txBody>
-          <a:bodyPr lIns="0" rIns="0" tIns="0" bIns="0" anchor="ctr"/>
-          <a:p>
-            <a:pPr algn="ctr"/>
-            <a:r>
-              <a:rPr b="0" lang="ru-RU" sz="4400" spc="-1" strike="noStrike">
-                <a:latin typeface="Arial"/>
-              </a:rPr>
-              <a:t>.NET</a:t>
-            </a:r>
-            <a:endParaRPr b="0" lang="ru-RU" sz="4400" spc="-1" strike="noStrike">
-              <a:latin typeface="Arial"/>
-            </a:endParaRPr>
-          </a:p>
-        </p:txBody>
-      </p:sp>
-      <p:sp>
-        <p:nvSpPr>
-          <p:cNvPr id="41" name="TextShape 2"/>
-          <p:cNvSpPr txBox="1"/>
+        <p:style>
+          <a:lnRef idx="0"/>
+          <a:fillRef idx="0"/>
+          <a:effectRef idx="0"/>
+          <a:fontRef idx="minor"/>
+        </p:style>
+        <p:txBody>
+          <a:bodyPr lIns="90000" rIns="90000" tIns="45000" bIns="45000"/>
+          <a:p>
+            <a:pPr marL="216000" indent="-215640">
+              <a:lnSpc>
+                <a:spcPct val="150000"/>
+              </a:lnSpc>
+              <a:spcBef>
+                <a:spcPts val="451"/>
+              </a:spcBef>
+              <a:spcAft>
+                <a:spcPts val="451"/>
+              </a:spcAft>
+              <a:buClr>
+                <a:srgbClr val="000000"/>
+              </a:buClr>
+              <a:buSzPct val="45000"/>
+              <a:buFont typeface="Wingdings" charset="2"/>
+              <a:buChar char=""/>
+            </a:pPr>
+            <a:r>
+              <a:rPr b="0" lang="ru-RU" sz="1500" spc="-1" strike="noStrike">
+                <a:solidFill>
+                  <a:srgbClr val="000000"/>
+                </a:solidFill>
+                <a:latin typeface="Open Sans"/>
+              </a:rPr>
+              <a:t>.NET Framework 1.0 — 1 мая 2002 года</a:t>
+            </a:r>
+            <a:endParaRPr b="0" lang="ru-RU" sz="1500" spc="-1" strike="noStrike">
+              <a:latin typeface="Arial"/>
+            </a:endParaRPr>
+          </a:p>
+          <a:p>
+            <a:pPr marL="216000" indent="-215640">
+              <a:lnSpc>
+                <a:spcPct val="150000"/>
+              </a:lnSpc>
+              <a:spcBef>
+                <a:spcPts val="451"/>
+              </a:spcBef>
+              <a:spcAft>
+                <a:spcPts val="451"/>
+              </a:spcAft>
+              <a:buClr>
+                <a:srgbClr val="000000"/>
+              </a:buClr>
+              <a:buSzPct val="45000"/>
+              <a:buFont typeface="Wingdings" charset="2"/>
+              <a:buChar char=""/>
+            </a:pPr>
+            <a:r>
+              <a:rPr b="0" lang="ru-RU" sz="1500" spc="-1" strike="noStrike">
+                <a:solidFill>
+                  <a:srgbClr val="000000"/>
+                </a:solidFill>
+                <a:latin typeface="Open Sans"/>
+              </a:rPr>
+              <a:t>.NET Framework 4.8 – последняя версия классического .NET</a:t>
+            </a:r>
+            <a:endParaRPr b="0" lang="ru-RU" sz="1500" spc="-1" strike="noStrike">
+              <a:latin typeface="Arial"/>
+            </a:endParaRPr>
+          </a:p>
+          <a:p>
+            <a:pPr marL="216000" indent="-215640">
+              <a:lnSpc>
+                <a:spcPct val="150000"/>
+              </a:lnSpc>
+              <a:spcBef>
+                <a:spcPts val="451"/>
+              </a:spcBef>
+              <a:spcAft>
+                <a:spcPts val="451"/>
+              </a:spcAft>
+              <a:buClr>
+                <a:srgbClr val="000000"/>
+              </a:buClr>
+              <a:buSzPct val="45000"/>
+              <a:buFont typeface="Wingdings" charset="2"/>
+              <a:buChar char=""/>
+            </a:pPr>
+            <a:r>
+              <a:rPr b="0" lang="ru-RU" sz="1500" spc="-1" strike="noStrike">
+                <a:solidFill>
+                  <a:srgbClr val="000000"/>
+                </a:solidFill>
+                <a:latin typeface="Open Sans"/>
+              </a:rPr>
+              <a:t>.NET Core 1.0 – 17 мая 2016 года</a:t>
+            </a:r>
+            <a:endParaRPr b="0" lang="ru-RU" sz="1500" spc="-1" strike="noStrike">
+              <a:latin typeface="Arial"/>
+            </a:endParaRPr>
+          </a:p>
+          <a:p>
+            <a:pPr marL="216000" indent="-215640">
+              <a:lnSpc>
+                <a:spcPct val="150000"/>
+              </a:lnSpc>
+              <a:spcBef>
+                <a:spcPts val="451"/>
+              </a:spcBef>
+              <a:spcAft>
+                <a:spcPts val="451"/>
+              </a:spcAft>
+              <a:buClr>
+                <a:srgbClr val="000000"/>
+              </a:buClr>
+              <a:buSzPct val="45000"/>
+              <a:buFont typeface="Wingdings" charset="2"/>
+              <a:buChar char=""/>
+            </a:pPr>
+            <a:r>
+              <a:rPr b="0" lang="ru-RU" sz="1500" spc="-1" strike="noStrike">
+                <a:solidFill>
+                  <a:srgbClr val="000000"/>
+                </a:solidFill>
+                <a:latin typeface="Open Sans"/>
+              </a:rPr>
+              <a:t>.NET Core 2.0 – 14 августа 2017 года</a:t>
+            </a:r>
+            <a:endParaRPr b="0" lang="ru-RU" sz="1500" spc="-1" strike="noStrike">
+              <a:latin typeface="Arial"/>
+            </a:endParaRPr>
+          </a:p>
+          <a:p>
+            <a:pPr marL="216000" indent="-215640">
+              <a:lnSpc>
+                <a:spcPct val="150000"/>
+              </a:lnSpc>
+              <a:spcBef>
+                <a:spcPts val="451"/>
+              </a:spcBef>
+              <a:spcAft>
+                <a:spcPts val="451"/>
+              </a:spcAft>
+              <a:buClr>
+                <a:srgbClr val="000000"/>
+              </a:buClr>
+              <a:buSzPct val="45000"/>
+              <a:buFont typeface="Wingdings" charset="2"/>
+              <a:buChar char=""/>
+            </a:pPr>
+            <a:r>
+              <a:rPr b="0" lang="ru-RU" sz="1500" spc="-1" strike="noStrike">
+                <a:solidFill>
+                  <a:srgbClr val="000000"/>
+                </a:solidFill>
+                <a:latin typeface="Open Sans"/>
+                <a:ea typeface="Microsoft YaHei"/>
+              </a:rPr>
+              <a:t>.NET Core 3.0 – </a:t>
+            </a:r>
+            <a:r>
+              <a:rPr b="0" lang="ru-RU" sz="1500" spc="-1" strike="noStrike">
+                <a:solidFill>
+                  <a:srgbClr val="000000"/>
+                </a:solidFill>
+                <a:latin typeface="Open Sans"/>
+              </a:rPr>
+              <a:t>23 сентября 2019 года</a:t>
+            </a:r>
+            <a:endParaRPr b="0" lang="ru-RU" sz="1500" spc="-1" strike="noStrike">
+              <a:latin typeface="Arial"/>
+            </a:endParaRPr>
+          </a:p>
+          <a:p>
+            <a:pPr marL="216000" indent="-215640">
+              <a:lnSpc>
+                <a:spcPct val="150000"/>
+              </a:lnSpc>
+              <a:spcBef>
+                <a:spcPts val="451"/>
+              </a:spcBef>
+              <a:spcAft>
+                <a:spcPts val="451"/>
+              </a:spcAft>
+              <a:buClr>
+                <a:srgbClr val="000000"/>
+              </a:buClr>
+              <a:buSzPct val="45000"/>
+              <a:buFont typeface="Wingdings" charset="2"/>
+              <a:buChar char=""/>
+            </a:pPr>
+            <a:r>
+              <a:rPr b="0" lang="ru-RU" sz="1500" spc="-1" strike="noStrike">
+                <a:solidFill>
+                  <a:srgbClr val="000000"/>
+                </a:solidFill>
+                <a:latin typeface="Open Sans"/>
+                <a:ea typeface="Microsoft YaHei"/>
+              </a:rPr>
+              <a:t>.NET Core 3.1 –</a:t>
+            </a:r>
+            <a:r>
+              <a:rPr b="0" lang="ru-RU" sz="1500" spc="-1" strike="noStrike">
+                <a:solidFill>
+                  <a:srgbClr val="000000"/>
+                </a:solidFill>
+                <a:latin typeface="Open Sans"/>
+              </a:rPr>
+              <a:t>  3 декабря 2019</a:t>
+            </a:r>
+            <a:endParaRPr b="0" lang="ru-RU" sz="1500" spc="-1" strike="noStrike">
+              <a:latin typeface="Arial"/>
+            </a:endParaRPr>
+          </a:p>
+          <a:p>
+            <a:pPr marL="216000" indent="-215640">
+              <a:lnSpc>
+                <a:spcPct val="150000"/>
+              </a:lnSpc>
+              <a:spcBef>
+                <a:spcPts val="451"/>
+              </a:spcBef>
+              <a:spcAft>
+                <a:spcPts val="451"/>
+              </a:spcAft>
+              <a:buClr>
+                <a:srgbClr val="000000"/>
+              </a:buClr>
+              <a:buSzPct val="45000"/>
+              <a:buFont typeface="Wingdings" charset="2"/>
+              <a:buChar char=""/>
+            </a:pPr>
+            <a:r>
+              <a:rPr b="0" lang="ru-RU" sz="1500" spc="-1" strike="noStrike">
+                <a:solidFill>
+                  <a:srgbClr val="000000"/>
+                </a:solidFill>
+                <a:latin typeface="Open Sans"/>
+                <a:ea typeface="Microsoft YaHei"/>
+              </a:rPr>
+              <a:t>Много языков –</a:t>
+            </a:r>
+            <a:r>
+              <a:rPr b="0" lang="ru-RU" sz="1500" spc="-1" strike="noStrike">
+                <a:solidFill>
+                  <a:srgbClr val="000000"/>
+                </a:solidFill>
+                <a:latin typeface="Open Sans"/>
+              </a:rPr>
+              <a:t> один CLR (Common Language Runtime)</a:t>
+            </a:r>
+            <a:endParaRPr b="0" lang="ru-RU" sz="1500" spc="-1" strike="noStrike">
+              <a:latin typeface="Arial"/>
+            </a:endParaRPr>
+          </a:p>
+          <a:p>
+            <a:pPr marL="216000" indent="-215640">
+              <a:lnSpc>
+                <a:spcPct val="150000"/>
+              </a:lnSpc>
+              <a:spcBef>
+                <a:spcPts val="451"/>
+              </a:spcBef>
+              <a:spcAft>
+                <a:spcPts val="451"/>
+              </a:spcAft>
+              <a:buClr>
+                <a:srgbClr val="000000"/>
+              </a:buClr>
+              <a:buSzPct val="45000"/>
+              <a:buFont typeface="Wingdings" charset="2"/>
+              <a:buChar char=""/>
+            </a:pPr>
+            <a:r>
+              <a:rPr b="0" lang="ru-RU" sz="1500" spc="-1" strike="noStrike">
+                <a:solidFill>
+                  <a:srgbClr val="000000"/>
+                </a:solidFill>
+                <a:latin typeface="Open Sans"/>
+              </a:rPr>
+              <a:t>CIL (Common Intermediate Language) – ECMA-335</a:t>
+            </a:r>
+            <a:endParaRPr b="0" lang="ru-RU" sz="1500" spc="-1" strike="noStrike">
+              <a:latin typeface="Arial"/>
+            </a:endParaRPr>
+          </a:p>
+          <a:p>
+            <a:pPr marL="216000" indent="-215640">
+              <a:lnSpc>
+                <a:spcPct val="150000"/>
+              </a:lnSpc>
+              <a:buClr>
+                <a:srgbClr val="000000"/>
+              </a:buClr>
+              <a:buSzPct val="45000"/>
+              <a:buFont typeface="Wingdings" charset="2"/>
+              <a:buChar char=""/>
+            </a:pPr>
+            <a:r>
+              <a:rPr b="0" lang="ru-RU" sz="1500" spc="-1" strike="noStrike">
+                <a:solidFill>
+                  <a:srgbClr val="000000"/>
+                </a:solidFill>
+                <a:latin typeface="Open Sans"/>
+              </a:rPr>
+              <a:t>C# - ECMA-334</a:t>
+            </a:r>
+            <a:endParaRPr b="0" lang="ru-RU" sz="1500" spc="-1" strike="noStrike">
+              <a:latin typeface="Arial"/>
+            </a:endParaRPr>
+          </a:p>
+        </p:txBody>
+      </p:sp>
+      <p:sp>
+        <p:nvSpPr>
+          <p:cNvPr id="41" name="CustomShape 2"/>
+          <p:cNvSpPr/>
           <p:nvPr/>
         </p:nvSpPr>
         <p:spPr>
           <a:xfrm>
-            <a:off x="521280" y="921600"/>
-            <a:ext cx="6801120" cy="4124160"/>
+            <a:off x="578160" y="34560"/>
+            <a:ext cx="10797480" cy="1261080"/>
           </a:xfrm>
           <a:prstGeom prst="rect">
             <a:avLst/>
@@ -2824,293 +3171,42 @@
             <a:noFill/>
           </a:ln>
         </p:spPr>
-        <p:txBody>
-          <a:bodyPr lIns="90000" rIns="90000" tIns="45000" bIns="45000"/>
-          <a:p>
-            <a:pPr marL="216000" indent="-216000">
-              <a:lnSpc>
-                <a:spcPct val="150000"/>
-              </a:lnSpc>
-              <a:spcBef>
-                <a:spcPts val="451"/>
-              </a:spcBef>
-              <a:spcAft>
-                <a:spcPts val="451"/>
-              </a:spcAft>
-              <a:buClr>
-                <a:srgbClr val="000000"/>
-              </a:buClr>
-              <a:buSzPct val="45000"/>
-              <a:buFont typeface="Wingdings" charset="2"/>
-              <a:buChar char=""/>
-            </a:pPr>
-            <a:r>
-              <a:rPr b="0" lang="ru-RU" sz="1500" spc="-1" strike="noStrike">
-                <a:solidFill>
-                  <a:srgbClr val="000000"/>
-                </a:solidFill>
-                <a:latin typeface="Open Sans"/>
-              </a:rPr>
-              <a:t>.NET Framework 1.0 — 1 мая 2002 года</a:t>
-            </a:r>
-            <a:endParaRPr b="0" lang="ru-RU" sz="1500" spc="-1" strike="noStrike">
-              <a:latin typeface="Arial"/>
-            </a:endParaRPr>
-          </a:p>
-          <a:p>
-            <a:pPr marL="216000" indent="-216000">
-              <a:lnSpc>
-                <a:spcPct val="150000"/>
-              </a:lnSpc>
-              <a:spcBef>
-                <a:spcPts val="451"/>
-              </a:spcBef>
-              <a:spcAft>
-                <a:spcPts val="451"/>
-              </a:spcAft>
-              <a:buClr>
-                <a:srgbClr val="000000"/>
-              </a:buClr>
-              <a:buSzPct val="45000"/>
-              <a:buFont typeface="Wingdings" charset="2"/>
-              <a:buChar char=""/>
-            </a:pPr>
-            <a:r>
-              <a:rPr b="0" lang="ru-RU" sz="1500" spc="-1" strike="noStrike">
-                <a:solidFill>
-                  <a:srgbClr val="000000"/>
-                </a:solidFill>
-                <a:latin typeface="Open Sans"/>
-              </a:rPr>
-              <a:t>.NET Framework 4.7.1 — 17 октября 2017 года</a:t>
-            </a:r>
-            <a:endParaRPr b="0" lang="ru-RU" sz="1500" spc="-1" strike="noStrike">
-              <a:latin typeface="Arial"/>
-            </a:endParaRPr>
-          </a:p>
-          <a:p>
-            <a:pPr marL="216000" indent="-216000">
-              <a:lnSpc>
-                <a:spcPct val="150000"/>
-              </a:lnSpc>
-              <a:spcBef>
-                <a:spcPts val="451"/>
-              </a:spcBef>
-              <a:spcAft>
-                <a:spcPts val="451"/>
-              </a:spcAft>
-              <a:buClr>
-                <a:srgbClr val="000000"/>
-              </a:buClr>
-              <a:buSzPct val="45000"/>
-              <a:buFont typeface="Wingdings" charset="2"/>
-              <a:buChar char=""/>
-            </a:pPr>
-            <a:r>
-              <a:rPr b="0" lang="ru-RU" sz="1500" spc="-1" strike="noStrike">
-                <a:solidFill>
-                  <a:srgbClr val="000000"/>
-                </a:solidFill>
-                <a:latin typeface="Open Sans"/>
-              </a:rPr>
-              <a:t>.NET Framework 4.8 – Early access, последняя версия классического .NET</a:t>
-            </a:r>
-            <a:endParaRPr b="0" lang="ru-RU" sz="1500" spc="-1" strike="noStrike">
-              <a:latin typeface="Arial"/>
-            </a:endParaRPr>
-          </a:p>
-          <a:p>
-            <a:pPr marL="216000" indent="-216000">
-              <a:lnSpc>
-                <a:spcPct val="150000"/>
-              </a:lnSpc>
-              <a:spcBef>
-                <a:spcPts val="451"/>
-              </a:spcBef>
-              <a:spcAft>
-                <a:spcPts val="451"/>
-              </a:spcAft>
-              <a:buClr>
-                <a:srgbClr val="000000"/>
-              </a:buClr>
-              <a:buSzPct val="45000"/>
-              <a:buFont typeface="Wingdings" charset="2"/>
-              <a:buChar char=""/>
-            </a:pPr>
-            <a:r>
-              <a:rPr b="0" lang="ru-RU" sz="1500" spc="-1" strike="noStrike">
-                <a:solidFill>
-                  <a:srgbClr val="000000"/>
-                </a:solidFill>
-                <a:latin typeface="Open Sans"/>
-              </a:rPr>
-              <a:t>.NET Core 1.0 – 17 мая 2016 года</a:t>
-            </a:r>
-            <a:endParaRPr b="0" lang="ru-RU" sz="1500" spc="-1" strike="noStrike">
-              <a:latin typeface="Arial"/>
-            </a:endParaRPr>
-          </a:p>
-          <a:p>
-            <a:pPr marL="216000" indent="-216000">
-              <a:lnSpc>
-                <a:spcPct val="150000"/>
-              </a:lnSpc>
-              <a:spcBef>
-                <a:spcPts val="451"/>
-              </a:spcBef>
-              <a:spcAft>
-                <a:spcPts val="451"/>
-              </a:spcAft>
-              <a:buClr>
-                <a:srgbClr val="000000"/>
-              </a:buClr>
-              <a:buSzPct val="45000"/>
-              <a:buFont typeface="Wingdings" charset="2"/>
-              <a:buChar char=""/>
-            </a:pPr>
-            <a:r>
-              <a:rPr b="0" lang="ru-RU" sz="1500" spc="-1" strike="noStrike">
-                <a:solidFill>
-                  <a:srgbClr val="000000"/>
-                </a:solidFill>
-                <a:latin typeface="Open Sans"/>
-              </a:rPr>
-              <a:t>.NET Core 2.0 – 14 августа 2017 года</a:t>
-            </a:r>
-            <a:endParaRPr b="0" lang="ru-RU" sz="1500" spc="-1" strike="noStrike">
-              <a:latin typeface="Arial"/>
-            </a:endParaRPr>
-          </a:p>
-          <a:p>
-            <a:pPr marL="216000" indent="-216000">
-              <a:lnSpc>
-                <a:spcPct val="150000"/>
-              </a:lnSpc>
-              <a:spcBef>
-                <a:spcPts val="451"/>
-              </a:spcBef>
-              <a:spcAft>
-                <a:spcPts val="451"/>
-              </a:spcAft>
-              <a:buClr>
-                <a:srgbClr val="000000"/>
-              </a:buClr>
-              <a:buSzPct val="45000"/>
-              <a:buFont typeface="Wingdings" charset="2"/>
-              <a:buChar char=""/>
-            </a:pPr>
-            <a:r>
-              <a:rPr b="0" lang="ru-RU" sz="1500" spc="-1" strike="noStrike">
-                <a:solidFill>
-                  <a:srgbClr val="000000"/>
-                </a:solidFill>
-                <a:latin typeface="Open Sans"/>
-              </a:rPr>
-              <a:t>.NET Core 3.0 – релиз запланирован на 2019 год</a:t>
-            </a:r>
-            <a:endParaRPr b="0" lang="ru-RU" sz="1500" spc="-1" strike="noStrike">
-              <a:latin typeface="Arial"/>
-            </a:endParaRPr>
-          </a:p>
-          <a:p>
-            <a:pPr marL="216000" indent="-216000">
-              <a:lnSpc>
-                <a:spcPct val="150000"/>
-              </a:lnSpc>
-              <a:spcBef>
-                <a:spcPts val="451"/>
-              </a:spcBef>
-              <a:spcAft>
-                <a:spcPts val="451"/>
-              </a:spcAft>
-              <a:buClr>
-                <a:srgbClr val="000000"/>
-              </a:buClr>
-              <a:buSzPct val="45000"/>
-              <a:buFont typeface="Wingdings" charset="2"/>
-              <a:buChar char=""/>
-            </a:pPr>
-            <a:r>
-              <a:rPr b="0" lang="ru-RU" sz="1500" spc="-1" strike="noStrike">
-                <a:solidFill>
-                  <a:srgbClr val="000000"/>
-                </a:solidFill>
-                <a:latin typeface="Open Sans"/>
-              </a:rPr>
-              <a:t>Много языков — один CLR (Common Language Runtime)</a:t>
-            </a:r>
-            <a:endParaRPr b="0" lang="ru-RU" sz="1500" spc="-1" strike="noStrike">
-              <a:latin typeface="Arial"/>
-            </a:endParaRPr>
-          </a:p>
-          <a:p>
-            <a:pPr marL="216000" indent="-216000">
-              <a:lnSpc>
-                <a:spcPct val="150000"/>
-              </a:lnSpc>
-              <a:spcBef>
-                <a:spcPts val="451"/>
-              </a:spcBef>
-              <a:spcAft>
-                <a:spcPts val="451"/>
-              </a:spcAft>
-              <a:buClr>
-                <a:srgbClr val="000000"/>
-              </a:buClr>
-              <a:buSzPct val="45000"/>
-              <a:buFont typeface="Wingdings" charset="2"/>
-              <a:buChar char=""/>
-            </a:pPr>
-            <a:r>
-              <a:rPr b="0" lang="ru-RU" sz="1500" spc="-1" strike="noStrike">
-                <a:solidFill>
-                  <a:srgbClr val="000000"/>
-                </a:solidFill>
-                <a:latin typeface="Open Sans"/>
-              </a:rPr>
-              <a:t>CIL (Common Intermediate Language) – ECMA-335</a:t>
-            </a:r>
-            <a:endParaRPr b="0" lang="ru-RU" sz="1500" spc="-1" strike="noStrike">
-              <a:latin typeface="Arial"/>
-            </a:endParaRPr>
-          </a:p>
-          <a:p>
-            <a:pPr marL="216000" indent="-216000">
-              <a:lnSpc>
-                <a:spcPct val="150000"/>
-              </a:lnSpc>
-              <a:buClr>
-                <a:srgbClr val="000000"/>
-              </a:buClr>
-              <a:buSzPct val="45000"/>
-              <a:buFont typeface="Wingdings" charset="2"/>
-              <a:buChar char=""/>
-            </a:pPr>
-            <a:r>
-              <a:rPr b="0" lang="ru-RU" sz="1500" spc="-1" strike="noStrike">
-                <a:solidFill>
-                  <a:srgbClr val="000000"/>
-                </a:solidFill>
-                <a:latin typeface="Open Sans"/>
-              </a:rPr>
-              <a:t>C# - ECMA-334</a:t>
-            </a:r>
-            <a:endParaRPr b="0" lang="ru-RU" sz="1500" spc="-1" strike="noStrike">
-              <a:latin typeface="Arial"/>
-            </a:endParaRPr>
-          </a:p>
-        </p:txBody>
-      </p:sp>
-      <p:sp>
-        <p:nvSpPr>
-          <p:cNvPr id="42" name="TextShape 3"/>
-          <p:cNvSpPr txBox="1"/>
+        <p:style>
+          <a:lnRef idx="0"/>
+          <a:fillRef idx="0"/>
+          <a:effectRef idx="0"/>
+          <a:fontRef idx="minor"/>
+        </p:style>
+        <p:txBody>
+          <a:bodyPr lIns="0" rIns="0" tIns="0" bIns="0" anchor="ctr"/>
+          <a:p>
+            <a:pPr algn="ctr">
+              <a:lnSpc>
+                <a:spcPct val="100000"/>
+              </a:lnSpc>
+            </a:pPr>
+            <a:r>
+              <a:rPr b="0" lang="ru-RU" sz="4400" spc="-1" strike="noStrike">
+                <a:latin typeface="Arial"/>
+              </a:rPr>
+              <a:t>.NET</a:t>
+            </a:r>
+            <a:endParaRPr b="0" lang="ru-RU" sz="4400" spc="-1" strike="noStrike">
+              <a:latin typeface="Arial"/>
+            </a:endParaRPr>
+          </a:p>
+        </p:txBody>
+      </p:sp>
+      <p:sp>
+        <p:nvSpPr>
+          <p:cNvPr id="42" name="CustomShape 3"/>
+          <p:cNvSpPr/>
           <p:nvPr/>
         </p:nvSpPr>
         <p:spPr>
           <a:xfrm>
             <a:off x="360000" y="5400000"/>
-            <a:ext cx="10797840" cy="1261440"/>
+            <a:ext cx="10797480" cy="1261080"/>
           </a:xfrm>
           <a:prstGeom prst="rect">
             <a:avLst/>
@@ -3120,6 +3216,12 @@
             <a:noFill/>
           </a:ln>
         </p:spPr>
+        <p:style>
+          <a:lnRef idx="0"/>
+          <a:fillRef idx="0"/>
+          <a:effectRef idx="0"/>
+          <a:fontRef idx="minor"/>
+        </p:style>
         <p:txBody>
           <a:bodyPr lIns="0" rIns="0" tIns="0" bIns="0" anchor="ctr"/>
           <a:p>
@@ -3127,7 +3229,7 @@
               <a:rPr b="0" lang="ru-RU" sz="2800" spc="-1" strike="noStrike">
                 <a:latin typeface="Arial"/>
               </a:rPr>
-              <a:t>Введение в промышленное программирование</a:t>
+              <a:t>Основы разработки корпоративных систем на платформе .NET</a:t>
             </a:r>
             <a:endParaRPr b="0" lang="ru-RU" sz="2800" spc="-1" strike="noStrike">
               <a:latin typeface="Arial"/>
@@ -3186,14 +3288,14 @@
       </p:grpSpPr>
       <p:sp>
         <p:nvSpPr>
-          <p:cNvPr id="43" name="TextShape 1"/>
-          <p:cNvSpPr txBox="1"/>
+          <p:cNvPr id="43" name="CustomShape 1"/>
+          <p:cNvSpPr/>
           <p:nvPr/>
         </p:nvSpPr>
         <p:spPr>
           <a:xfrm>
             <a:off x="578160" y="34560"/>
-            <a:ext cx="10797840" cy="1261440"/>
+            <a:ext cx="10797480" cy="1261080"/>
           </a:xfrm>
           <a:prstGeom prst="rect">
             <a:avLst/>
@@ -3203,10 +3305,20 @@
             <a:noFill/>
           </a:ln>
         </p:spPr>
+        <p:style>
+          <a:lnRef idx="0"/>
+          <a:fillRef idx="0"/>
+          <a:effectRef idx="0"/>
+          <a:fontRef idx="minor"/>
+        </p:style>
         <p:txBody>
           <a:bodyPr lIns="0" rIns="0" tIns="0" bIns="0" anchor="ctr"/>
           <a:p>
-            <a:pPr algn="ctr"/>
+            <a:pPr algn="ctr">
+              <a:lnSpc>
+                <a:spcPct val="100000"/>
+              </a:lnSpc>
+            </a:pPr>
             <a:r>
               <a:rPr b="0" lang="ru-RU" sz="4400" spc="-1" strike="noStrike">
                 <a:latin typeface="Arial"/>
@@ -3221,14 +3333,14 @@
       </p:sp>
       <p:sp>
         <p:nvSpPr>
-          <p:cNvPr id="44" name="TextShape 2"/>
-          <p:cNvSpPr txBox="1"/>
+          <p:cNvPr id="44" name="CustomShape 2"/>
+          <p:cNvSpPr/>
           <p:nvPr/>
         </p:nvSpPr>
         <p:spPr>
           <a:xfrm>
             <a:off x="521280" y="921600"/>
-            <a:ext cx="6801120" cy="3758040"/>
+            <a:ext cx="6800760" cy="3757680"/>
           </a:xfrm>
           <a:prstGeom prst="rect">
             <a:avLst/>
@@ -3238,10 +3350,16 @@
             <a:noFill/>
           </a:ln>
         </p:spPr>
+        <p:style>
+          <a:lnRef idx="0"/>
+          <a:fillRef idx="0"/>
+          <a:effectRef idx="0"/>
+          <a:fontRef idx="minor"/>
+        </p:style>
         <p:txBody>
           <a:bodyPr lIns="90000" rIns="90000" tIns="45000" bIns="45000"/>
           <a:p>
-            <a:pPr marL="216000" indent="-216000">
+            <a:pPr marL="216000" indent="-215640">
               <a:lnSpc>
                 <a:spcPct val="100000"/>
               </a:lnSpc>
@@ -3265,14 +3383,14 @@
                 </a:solidFill>
                 <a:latin typeface="Open Sans"/>
               </a:rPr>
-              <a:t>.NET Core – официальная альтернатива Mono (почти три года полет нормальный, выходит 3-я версия)</a:t>
-            </a:r>
-            <a:endParaRPr b="0" lang="ru-RU" sz="1500" spc="-1" strike="noStrike">
-              <a:latin typeface="Arial"/>
-            </a:endParaRPr>
-          </a:p>
-          <a:p>
-            <a:pPr marL="216000" indent="-216000">
+              <a:t>.NET Core – приоритетный способ разработки приложений под .NET</a:t>
+            </a:r>
+            <a:endParaRPr b="0" lang="ru-RU" sz="1500" spc="-1" strike="noStrike">
+              <a:latin typeface="Arial"/>
+            </a:endParaRPr>
+          </a:p>
+          <a:p>
+            <a:pPr marL="216000" indent="-215640">
               <a:lnSpc>
                 <a:spcPct val="100000"/>
               </a:lnSpc>
@@ -3296,14 +3414,14 @@
                 </a:solidFill>
                 <a:latin typeface="Open Sans"/>
               </a:rPr>
-              <a:t>Visual Studio Team Services</a:t>
-            </a:r>
-            <a:endParaRPr b="0" lang="ru-RU" sz="1500" spc="-1" strike="noStrike">
-              <a:latin typeface="Arial"/>
-            </a:endParaRPr>
-          </a:p>
-          <a:p>
-            <a:pPr marL="216000" indent="-216000">
+              <a:t>Visual Studio, Visual Studio Code (Atom, кроссплатформенный редактор), Visual Studio TFS/Azure DevOps</a:t>
+            </a:r>
+            <a:endParaRPr b="0" lang="ru-RU" sz="1500" spc="-1" strike="noStrike">
+              <a:latin typeface="Arial"/>
+            </a:endParaRPr>
+          </a:p>
+          <a:p>
+            <a:pPr marL="216000" indent="-215640">
               <a:lnSpc>
                 <a:spcPct val="100000"/>
               </a:lnSpc>
@@ -3334,7 +3452,7 @@
             </a:endParaRPr>
           </a:p>
           <a:p>
-            <a:pPr marL="216000" indent="-216000">
+            <a:pPr marL="216000" indent="-215640">
               <a:lnSpc>
                 <a:spcPct val="100000"/>
               </a:lnSpc>
@@ -3365,7 +3483,7 @@
             </a:endParaRPr>
           </a:p>
           <a:p>
-            <a:pPr marL="216000" indent="-216000">
+            <a:pPr marL="216000" indent="-215640">
               <a:lnSpc>
                 <a:spcPct val="100000"/>
               </a:lnSpc>
@@ -3396,7 +3514,7 @@
             </a:endParaRPr>
           </a:p>
           <a:p>
-            <a:pPr marL="216000" indent="-216000">
+            <a:pPr marL="216000" indent="-215640">
               <a:lnSpc>
                 <a:spcPct val="100000"/>
               </a:lnSpc>
@@ -3427,7 +3545,7 @@
             </a:endParaRPr>
           </a:p>
           <a:p>
-            <a:pPr marL="216000" indent="-216000">
+            <a:pPr marL="216000" indent="-215640">
               <a:lnSpc>
                 <a:spcPct val="100000"/>
               </a:lnSpc>
@@ -3458,7 +3576,7 @@
             </a:endParaRPr>
           </a:p>
           <a:p>
-            <a:pPr marL="216000" indent="-216000">
+            <a:pPr marL="216000" indent="-215640">
               <a:lnSpc>
                 <a:spcPct val="100000"/>
               </a:lnSpc>
@@ -3489,7 +3607,7 @@
             </a:endParaRPr>
           </a:p>
           <a:p>
-            <a:pPr marL="216000" indent="-216000">
+            <a:pPr marL="216000" indent="-215640">
               <a:lnSpc>
                 <a:spcPct val="150000"/>
               </a:lnSpc>
@@ -3523,14 +3641,14 @@
       </p:sp>
       <p:sp>
         <p:nvSpPr>
-          <p:cNvPr id="45" name="TextShape 3"/>
-          <p:cNvSpPr txBox="1"/>
+          <p:cNvPr id="45" name="CustomShape 3"/>
+          <p:cNvSpPr/>
           <p:nvPr/>
         </p:nvSpPr>
         <p:spPr>
           <a:xfrm>
             <a:off x="360000" y="5400000"/>
-            <a:ext cx="10797840" cy="1261440"/>
+            <a:ext cx="10797480" cy="1261080"/>
           </a:xfrm>
           <a:prstGeom prst="rect">
             <a:avLst/>
@@ -3540,6 +3658,12 @@
             <a:noFill/>
           </a:ln>
         </p:spPr>
+        <p:style>
+          <a:lnRef idx="0"/>
+          <a:fillRef idx="0"/>
+          <a:effectRef idx="0"/>
+          <a:fontRef idx="minor"/>
+        </p:style>
         <p:txBody>
           <a:bodyPr lIns="0" rIns="0" tIns="0" bIns="0" anchor="ctr"/>
           <a:p>
@@ -3547,7 +3671,7 @@
               <a:rPr b="0" lang="ru-RU" sz="2800" spc="-1" strike="noStrike">
                 <a:latin typeface="Arial"/>
               </a:rPr>
-              <a:t>Введение в промышленное программирование</a:t>
+              <a:t>Основы разработки корпоративных систем на платформе .NET</a:t>
             </a:r>
             <a:endParaRPr b="0" lang="ru-RU" sz="2800" spc="-1" strike="noStrike">
               <a:latin typeface="Arial"/>
@@ -3606,14 +3730,14 @@
       </p:grpSpPr>
       <p:sp>
         <p:nvSpPr>
-          <p:cNvPr id="46" name="TextShape 1"/>
-          <p:cNvSpPr txBox="1"/>
+          <p:cNvPr id="46" name="CustomShape 1"/>
+          <p:cNvSpPr/>
           <p:nvPr/>
         </p:nvSpPr>
         <p:spPr>
           <a:xfrm>
             <a:off x="578160" y="34560"/>
-            <a:ext cx="10797840" cy="1261440"/>
+            <a:ext cx="10797480" cy="1261080"/>
           </a:xfrm>
           <a:prstGeom prst="rect">
             <a:avLst/>
@@ -3623,10 +3747,20 @@
             <a:noFill/>
           </a:ln>
         </p:spPr>
+        <p:style>
+          <a:lnRef idx="0"/>
+          <a:fillRef idx="0"/>
+          <a:effectRef idx="0"/>
+          <a:fontRef idx="minor"/>
+        </p:style>
         <p:txBody>
           <a:bodyPr lIns="0" rIns="0" tIns="0" bIns="0" anchor="ctr"/>
           <a:p>
-            <a:pPr algn="ctr"/>
+            <a:pPr algn="ctr">
+              <a:lnSpc>
+                <a:spcPct val="100000"/>
+              </a:lnSpc>
+            </a:pPr>
             <a:r>
               <a:rPr b="0" lang="ru-RU" sz="4400" spc="-1" strike="noStrike">
                 <a:latin typeface="Arial"/>
@@ -3641,14 +3775,14 @@
       </p:sp>
       <p:sp>
         <p:nvSpPr>
-          <p:cNvPr id="47" name="TextShape 2"/>
-          <p:cNvSpPr txBox="1"/>
+          <p:cNvPr id="47" name="CustomShape 2"/>
+          <p:cNvSpPr/>
           <p:nvPr/>
         </p:nvSpPr>
         <p:spPr>
           <a:xfrm>
             <a:off x="616680" y="1224720"/>
-            <a:ext cx="6801120" cy="3123000"/>
+            <a:ext cx="6800760" cy="3122640"/>
           </a:xfrm>
           <a:prstGeom prst="rect">
             <a:avLst/>
@@ -3658,10 +3792,16 @@
             <a:noFill/>
           </a:ln>
         </p:spPr>
+        <p:style>
+          <a:lnRef idx="0"/>
+          <a:fillRef idx="0"/>
+          <a:effectRef idx="0"/>
+          <a:fontRef idx="minor"/>
+        </p:style>
         <p:txBody>
           <a:bodyPr lIns="90000" rIns="90000" tIns="45000" bIns="45000"/>
           <a:p>
-            <a:pPr marL="216000" indent="-216000">
+            <a:pPr marL="216000" indent="-215640">
               <a:lnSpc>
                 <a:spcPct val="100000"/>
               </a:lnSpc>
@@ -3692,7 +3832,7 @@
             </a:endParaRPr>
           </a:p>
           <a:p>
-            <a:pPr marL="216000" indent="-216000">
+            <a:pPr marL="216000" indent="-215640">
               <a:lnSpc>
                 <a:spcPct val="100000"/>
               </a:lnSpc>
@@ -3723,7 +3863,7 @@
             </a:endParaRPr>
           </a:p>
           <a:p>
-            <a:pPr marL="216000" indent="-216000">
+            <a:pPr marL="216000" indent="-215640">
               <a:lnSpc>
                 <a:spcPct val="100000"/>
               </a:lnSpc>
@@ -3754,7 +3894,7 @@
             </a:endParaRPr>
           </a:p>
           <a:p>
-            <a:pPr marL="216000" indent="-216000">
+            <a:pPr marL="216000" indent="-215640">
               <a:lnSpc>
                 <a:spcPct val="100000"/>
               </a:lnSpc>
@@ -3785,7 +3925,7 @@
             </a:endParaRPr>
           </a:p>
           <a:p>
-            <a:pPr marL="216000" indent="-216000">
+            <a:pPr marL="216000" indent="-215640">
               <a:lnSpc>
                 <a:spcPct val="100000"/>
               </a:lnSpc>
@@ -3816,7 +3956,7 @@
             </a:endParaRPr>
           </a:p>
           <a:p>
-            <a:pPr marL="216000" indent="-216000">
+            <a:pPr marL="216000" indent="-215640">
               <a:lnSpc>
                 <a:spcPct val="100000"/>
               </a:lnSpc>
@@ -3847,7 +3987,7 @@
             </a:endParaRPr>
           </a:p>
           <a:p>
-            <a:pPr marL="216000" indent="-216000">
+            <a:pPr marL="216000" indent="-215640">
               <a:lnSpc>
                 <a:spcPct val="100000"/>
               </a:lnSpc>
@@ -3878,7 +4018,7 @@
             </a:endParaRPr>
           </a:p>
           <a:p>
-            <a:pPr marL="216000" indent="-216000">
+            <a:pPr marL="216000" indent="-215640">
               <a:lnSpc>
                 <a:spcPct val="100000"/>
               </a:lnSpc>
@@ -3909,7 +4049,7 @@
             </a:endParaRPr>
           </a:p>
           <a:p>
-            <a:pPr marL="216000" indent="-216000">
+            <a:pPr marL="216000" indent="-215640">
               <a:lnSpc>
                 <a:spcPct val="100000"/>
               </a:lnSpc>
@@ -3943,14 +4083,14 @@
       </p:sp>
       <p:sp>
         <p:nvSpPr>
-          <p:cNvPr id="48" name="TextShape 3"/>
-          <p:cNvSpPr txBox="1"/>
+          <p:cNvPr id="48" name="CustomShape 3"/>
+          <p:cNvSpPr/>
           <p:nvPr/>
         </p:nvSpPr>
         <p:spPr>
           <a:xfrm>
             <a:off x="360000" y="5400000"/>
-            <a:ext cx="10797840" cy="1261440"/>
+            <a:ext cx="10797480" cy="1261080"/>
           </a:xfrm>
           <a:prstGeom prst="rect">
             <a:avLst/>
@@ -3960,6 +4100,12 @@
             <a:noFill/>
           </a:ln>
         </p:spPr>
+        <p:style>
+          <a:lnRef idx="0"/>
+          <a:fillRef idx="0"/>
+          <a:effectRef idx="0"/>
+          <a:fontRef idx="minor"/>
+        </p:style>
         <p:txBody>
           <a:bodyPr lIns="0" rIns="0" tIns="0" bIns="0" anchor="ctr"/>
           <a:p>
@@ -3967,7 +4113,7 @@
               <a:rPr b="0" lang="ru-RU" sz="2800" spc="-1" strike="noStrike">
                 <a:latin typeface="Arial"/>
               </a:rPr>
-              <a:t>Введение в промышленное программирование</a:t>
+              <a:t>Основы разработки корпоративных систем на платформе .NET</a:t>
             </a:r>
             <a:endParaRPr b="0" lang="ru-RU" sz="2800" spc="-1" strike="noStrike">
               <a:latin typeface="Arial"/>
@@ -4026,14 +4172,14 @@
       </p:grpSpPr>
       <p:sp>
         <p:nvSpPr>
-          <p:cNvPr id="49" name="TextShape 1"/>
-          <p:cNvSpPr txBox="1"/>
+          <p:cNvPr id="49" name="CustomShape 1"/>
+          <p:cNvSpPr/>
           <p:nvPr/>
         </p:nvSpPr>
         <p:spPr>
           <a:xfrm>
             <a:off x="578160" y="34560"/>
-            <a:ext cx="10797840" cy="1261440"/>
+            <a:ext cx="10797480" cy="1261080"/>
           </a:xfrm>
           <a:prstGeom prst="rect">
             <a:avLst/>
@@ -4043,10 +4189,20 @@
             <a:noFill/>
           </a:ln>
         </p:spPr>
+        <p:style>
+          <a:lnRef idx="0"/>
+          <a:fillRef idx="0"/>
+          <a:effectRef idx="0"/>
+          <a:fontRef idx="minor"/>
+        </p:style>
         <p:txBody>
           <a:bodyPr lIns="0" rIns="0" tIns="0" bIns="0" anchor="ctr"/>
           <a:p>
-            <a:pPr algn="ctr"/>
+            <a:pPr algn="ctr">
+              <a:lnSpc>
+                <a:spcPct val="100000"/>
+              </a:lnSpc>
+            </a:pPr>
             <a:r>
               <a:rPr b="0" lang="ru-RU" sz="4400" spc="-1" strike="noStrike">
                 <a:latin typeface="Arial"/>
@@ -4061,14 +4217,14 @@
       </p:sp>
       <p:sp>
         <p:nvSpPr>
-          <p:cNvPr id="50" name="TextShape 2"/>
-          <p:cNvSpPr txBox="1"/>
+          <p:cNvPr id="50" name="CustomShape 2"/>
+          <p:cNvSpPr/>
           <p:nvPr/>
         </p:nvSpPr>
         <p:spPr>
           <a:xfrm>
             <a:off x="578160" y="794520"/>
-            <a:ext cx="6801120" cy="4109040"/>
+            <a:ext cx="6800760" cy="4108680"/>
           </a:xfrm>
           <a:prstGeom prst="rect">
             <a:avLst/>
@@ -4078,10 +4234,16 @@
             <a:noFill/>
           </a:ln>
         </p:spPr>
+        <p:style>
+          <a:lnRef idx="0"/>
+          <a:fillRef idx="0"/>
+          <a:effectRef idx="0"/>
+          <a:fontRef idx="minor"/>
+        </p:style>
         <p:txBody>
           <a:bodyPr lIns="90000" rIns="90000" tIns="45000" bIns="45000"/>
           <a:p>
-            <a:pPr marL="216000" indent="-216000">
+            <a:pPr marL="216000" indent="-215640">
               <a:lnSpc>
                 <a:spcPct val="100000"/>
               </a:lnSpc>
@@ -4187,7 +4349,7 @@
             </a:endParaRPr>
           </a:p>
           <a:p>
-            <a:pPr marL="216000" indent="-216000">
+            <a:pPr marL="216000" indent="-215640">
               <a:lnSpc>
                 <a:spcPct val="100000"/>
               </a:lnSpc>
@@ -4268,7 +4430,7 @@
             </a:endParaRPr>
           </a:p>
           <a:p>
-            <a:pPr marL="216000" indent="-216000">
+            <a:pPr marL="216000" indent="-215640">
               <a:lnSpc>
                 <a:spcPct val="100000"/>
               </a:lnSpc>
@@ -4349,7 +4511,7 @@
             </a:endParaRPr>
           </a:p>
           <a:p>
-            <a:pPr marL="216000" indent="-216000">
+            <a:pPr marL="216000" indent="-215640">
               <a:lnSpc>
                 <a:spcPct val="100000"/>
               </a:lnSpc>
@@ -4433,14 +4595,14 @@
       </p:sp>
       <p:sp>
         <p:nvSpPr>
-          <p:cNvPr id="51" name="TextShape 3"/>
-          <p:cNvSpPr txBox="1"/>
+          <p:cNvPr id="51" name="CustomShape 3"/>
+          <p:cNvSpPr/>
           <p:nvPr/>
         </p:nvSpPr>
         <p:spPr>
           <a:xfrm>
             <a:off x="360000" y="5400000"/>
-            <a:ext cx="10797840" cy="1261440"/>
+            <a:ext cx="10797480" cy="1261080"/>
           </a:xfrm>
           <a:prstGeom prst="rect">
             <a:avLst/>
@@ -4450,6 +4612,12 @@
             <a:noFill/>
           </a:ln>
         </p:spPr>
+        <p:style>
+          <a:lnRef idx="0"/>
+          <a:fillRef idx="0"/>
+          <a:effectRef idx="0"/>
+          <a:fontRef idx="minor"/>
+        </p:style>
         <p:txBody>
           <a:bodyPr lIns="0" rIns="0" tIns="0" bIns="0" anchor="ctr"/>
           <a:p>
@@ -4457,7 +4625,7 @@
               <a:rPr b="0" lang="ru-RU" sz="2800" spc="-1" strike="noStrike">
                 <a:latin typeface="Arial"/>
               </a:rPr>
-              <a:t>Введение в промышленное программирование</a:t>
+              <a:t>Основы разработки корпоративных систем на платформе .NET</a:t>
             </a:r>
             <a:endParaRPr b="0" lang="ru-RU" sz="2800" spc="-1" strike="noStrike">
               <a:latin typeface="Arial"/>
@@ -4516,14 +4684,14 @@
       </p:grpSpPr>
       <p:sp>
         <p:nvSpPr>
-          <p:cNvPr id="52" name="TextShape 1"/>
-          <p:cNvSpPr txBox="1"/>
+          <p:cNvPr id="52" name="CustomShape 1"/>
+          <p:cNvSpPr/>
           <p:nvPr/>
         </p:nvSpPr>
         <p:spPr>
           <a:xfrm>
             <a:off x="578160" y="34560"/>
-            <a:ext cx="10797840" cy="1261440"/>
+            <a:ext cx="10797480" cy="1261080"/>
           </a:xfrm>
           <a:prstGeom prst="rect">
             <a:avLst/>
@@ -4533,10 +4701,20 @@
             <a:noFill/>
           </a:ln>
         </p:spPr>
+        <p:style>
+          <a:lnRef idx="0"/>
+          <a:fillRef idx="0"/>
+          <a:effectRef idx="0"/>
+          <a:fontRef idx="minor"/>
+        </p:style>
         <p:txBody>
           <a:bodyPr lIns="0" rIns="0" tIns="0" bIns="0" anchor="ctr"/>
           <a:p>
-            <a:pPr algn="ctr"/>
+            <a:pPr algn="ctr">
+              <a:lnSpc>
+                <a:spcPct val="100000"/>
+              </a:lnSpc>
+            </a:pPr>
             <a:r>
               <a:rPr b="0" lang="ru-RU" sz="4400" spc="-1" strike="noStrike">
                 <a:latin typeface="Arial"/>
@@ -4551,14 +4729,14 @@
       </p:sp>
       <p:sp>
         <p:nvSpPr>
-          <p:cNvPr id="53" name="TextShape 2"/>
-          <p:cNvSpPr txBox="1"/>
+          <p:cNvPr id="53" name="CustomShape 2"/>
+          <p:cNvSpPr/>
           <p:nvPr/>
         </p:nvSpPr>
         <p:spPr>
           <a:xfrm>
             <a:off x="578160" y="1368000"/>
-            <a:ext cx="6801120" cy="1944000"/>
+            <a:ext cx="6800760" cy="1943640"/>
           </a:xfrm>
           <a:prstGeom prst="rect">
             <a:avLst/>
@@ -4568,10 +4746,16 @@
             <a:noFill/>
           </a:ln>
         </p:spPr>
+        <p:style>
+          <a:lnRef idx="0"/>
+          <a:fillRef idx="0"/>
+          <a:effectRef idx="0"/>
+          <a:fontRef idx="minor"/>
+        </p:style>
         <p:txBody>
           <a:bodyPr lIns="90000" rIns="90000" tIns="45000" bIns="45000"/>
           <a:p>
-            <a:pPr marL="216000" indent="-216000">
+            <a:pPr marL="216000" indent="-215640">
               <a:lnSpc>
                 <a:spcPct val="100000"/>
               </a:lnSpc>
@@ -4602,7 +4786,7 @@
             </a:endParaRPr>
           </a:p>
           <a:p>
-            <a:pPr marL="216000" indent="-216000">
+            <a:pPr marL="216000" indent="-215640">
               <a:lnSpc>
                 <a:spcPct val="100000"/>
               </a:lnSpc>
@@ -4633,7 +4817,7 @@
             </a:endParaRPr>
           </a:p>
           <a:p>
-            <a:pPr marL="216000" indent="-216000">
+            <a:pPr marL="216000" indent="-215640">
               <a:lnSpc>
                 <a:spcPct val="100000"/>
               </a:lnSpc>
@@ -4664,7 +4848,7 @@
             </a:endParaRPr>
           </a:p>
           <a:p>
-            <a:pPr marL="216000" indent="-216000">
+            <a:pPr marL="216000" indent="-215640">
               <a:lnSpc>
                 <a:spcPct val="100000"/>
               </a:lnSpc>
@@ -4695,7 +4879,7 @@
             </a:endParaRPr>
           </a:p>
           <a:p>
-            <a:pPr marL="216000" indent="-216000">
+            <a:pPr marL="216000" indent="-215640">
               <a:lnSpc>
                 <a:spcPct val="100000"/>
               </a:lnSpc>
@@ -4726,7 +4910,7 @@
             </a:endParaRPr>
           </a:p>
           <a:p>
-            <a:pPr marL="216000" indent="-216000">
+            <a:pPr marL="216000" indent="-215640">
               <a:lnSpc>
                 <a:spcPct val="100000"/>
               </a:lnSpc>
@@ -4760,14 +4944,14 @@
       </p:sp>
       <p:sp>
         <p:nvSpPr>
-          <p:cNvPr id="54" name="TextShape 3"/>
-          <p:cNvSpPr txBox="1"/>
+          <p:cNvPr id="54" name="CustomShape 3"/>
+          <p:cNvSpPr/>
           <p:nvPr/>
         </p:nvSpPr>
         <p:spPr>
           <a:xfrm>
             <a:off x="360000" y="5400000"/>
-            <a:ext cx="10797840" cy="1261440"/>
+            <a:ext cx="10797480" cy="1261080"/>
           </a:xfrm>
           <a:prstGeom prst="rect">
             <a:avLst/>
@@ -4777,6 +4961,12 @@
             <a:noFill/>
           </a:ln>
         </p:spPr>
+        <p:style>
+          <a:lnRef idx="0"/>
+          <a:fillRef idx="0"/>
+          <a:effectRef idx="0"/>
+          <a:fontRef idx="minor"/>
+        </p:style>
         <p:txBody>
           <a:bodyPr lIns="0" rIns="0" tIns="0" bIns="0" anchor="ctr"/>
           <a:p>
@@ -4784,7 +4974,7 @@
               <a:rPr b="0" lang="ru-RU" sz="2800" spc="-1" strike="noStrike">
                 <a:latin typeface="Arial"/>
               </a:rPr>
-              <a:t>Введение в промышленное программирование</a:t>
+              <a:t>Основы разработки корпоративных систем на платформе .NET</a:t>
             </a:r>
             <a:endParaRPr b="0" lang="ru-RU" sz="2800" spc="-1" strike="noStrike">
               <a:latin typeface="Arial"/>
@@ -4843,14 +5033,14 @@
       </p:grpSpPr>
       <p:sp>
         <p:nvSpPr>
-          <p:cNvPr id="55" name="TextShape 1"/>
-          <p:cNvSpPr txBox="1"/>
+          <p:cNvPr id="55" name="CustomShape 1"/>
+          <p:cNvSpPr/>
           <p:nvPr/>
         </p:nvSpPr>
         <p:spPr>
           <a:xfrm>
             <a:off x="578160" y="34560"/>
-            <a:ext cx="10797840" cy="1261440"/>
+            <a:ext cx="10797480" cy="1261080"/>
           </a:xfrm>
           <a:prstGeom prst="rect">
             <a:avLst/>
@@ -4860,10 +5050,20 @@
             <a:noFill/>
           </a:ln>
         </p:spPr>
+        <p:style>
+          <a:lnRef idx="0"/>
+          <a:fillRef idx="0"/>
+          <a:effectRef idx="0"/>
+          <a:fontRef idx="minor"/>
+        </p:style>
         <p:txBody>
           <a:bodyPr lIns="0" rIns="0" tIns="0" bIns="0" anchor="ctr"/>
           <a:p>
-            <a:pPr algn="ctr"/>
+            <a:pPr algn="ctr">
+              <a:lnSpc>
+                <a:spcPct val="100000"/>
+              </a:lnSpc>
+            </a:pPr>
             <a:r>
               <a:rPr b="0" lang="ru-RU" sz="4400" spc="-1" strike="noStrike">
                 <a:latin typeface="Arial"/>
@@ -4878,14 +5078,14 @@
       </p:sp>
       <p:sp>
         <p:nvSpPr>
-          <p:cNvPr id="56" name="TextShape 2"/>
-          <p:cNvSpPr txBox="1"/>
+          <p:cNvPr id="56" name="CustomShape 2"/>
+          <p:cNvSpPr/>
           <p:nvPr/>
         </p:nvSpPr>
         <p:spPr>
           <a:xfrm>
             <a:off x="578160" y="1368000"/>
-            <a:ext cx="6801120" cy="2144520"/>
+            <a:ext cx="6800760" cy="2144160"/>
           </a:xfrm>
           <a:prstGeom prst="rect">
             <a:avLst/>
@@ -4895,10 +5095,16 @@
             <a:noFill/>
           </a:ln>
         </p:spPr>
+        <p:style>
+          <a:lnRef idx="0"/>
+          <a:fillRef idx="0"/>
+          <a:effectRef idx="0"/>
+          <a:fontRef idx="minor"/>
+        </p:style>
         <p:txBody>
           <a:bodyPr lIns="90000" rIns="90000" tIns="45000" bIns="45000"/>
           <a:p>
-            <a:pPr marL="216000" indent="-216000">
+            <a:pPr marL="216000" indent="-215640">
               <a:lnSpc>
                 <a:spcPct val="100000"/>
               </a:lnSpc>
@@ -4929,7 +5135,7 @@
             </a:endParaRPr>
           </a:p>
           <a:p>
-            <a:pPr marL="216000" indent="-216000">
+            <a:pPr marL="216000" indent="-215640">
               <a:lnSpc>
                 <a:spcPct val="100000"/>
               </a:lnSpc>
@@ -4960,7 +5166,7 @@
             </a:endParaRPr>
           </a:p>
           <a:p>
-            <a:pPr marL="216000" indent="-216000">
+            <a:pPr marL="216000" indent="-215640">
               <a:lnSpc>
                 <a:spcPct val="100000"/>
               </a:lnSpc>
@@ -4991,7 +5197,7 @@
             </a:endParaRPr>
           </a:p>
           <a:p>
-            <a:pPr marL="216000" indent="-216000">
+            <a:pPr marL="216000" indent="-215640">
               <a:lnSpc>
                 <a:spcPct val="100000"/>
               </a:lnSpc>
@@ -5022,7 +5228,7 @@
             </a:endParaRPr>
           </a:p>
           <a:p>
-            <a:pPr marL="216000" indent="-216000">
+            <a:pPr marL="216000" indent="-215640">
               <a:lnSpc>
                 <a:spcPct val="100000"/>
               </a:lnSpc>
@@ -5053,7 +5259,7 @@
             </a:endParaRPr>
           </a:p>
           <a:p>
-            <a:pPr marL="216000" indent="-216000">
+            <a:pPr marL="216000" indent="-215640">
               <a:lnSpc>
                 <a:spcPct val="100000"/>
               </a:lnSpc>
@@ -5087,14 +5293,14 @@
       </p:sp>
       <p:sp>
         <p:nvSpPr>
-          <p:cNvPr id="57" name="TextShape 3"/>
-          <p:cNvSpPr txBox="1"/>
+          <p:cNvPr id="57" name="CustomShape 3"/>
+          <p:cNvSpPr/>
           <p:nvPr/>
         </p:nvSpPr>
         <p:spPr>
           <a:xfrm>
             <a:off x="360000" y="5400000"/>
-            <a:ext cx="10797840" cy="1261440"/>
+            <a:ext cx="10797480" cy="1261080"/>
           </a:xfrm>
           <a:prstGeom prst="rect">
             <a:avLst/>
@@ -5104,6 +5310,12 @@
             <a:noFill/>
           </a:ln>
         </p:spPr>
+        <p:style>
+          <a:lnRef idx="0"/>
+          <a:fillRef idx="0"/>
+          <a:effectRef idx="0"/>
+          <a:fontRef idx="minor"/>
+        </p:style>
         <p:txBody>
           <a:bodyPr lIns="0" rIns="0" tIns="0" bIns="0" anchor="ctr"/>
           <a:p>
@@ -5111,7 +5323,7 @@
               <a:rPr b="0" lang="ru-RU" sz="2800" spc="-1" strike="noStrike">
                 <a:latin typeface="Arial"/>
               </a:rPr>
-              <a:t>Введение в промышленное программирование</a:t>
+              <a:t>Основы разработки корпоративных систем на платформе .NET</a:t>
             </a:r>
             <a:endParaRPr b="0" lang="ru-RU" sz="2800" spc="-1" strike="noStrike">
               <a:latin typeface="Arial"/>
@@ -5170,14 +5382,14 @@
       </p:grpSpPr>
       <p:sp>
         <p:nvSpPr>
-          <p:cNvPr id="58" name="TextShape 1"/>
-          <p:cNvSpPr txBox="1"/>
+          <p:cNvPr id="58" name="CustomShape 1"/>
+          <p:cNvSpPr/>
           <p:nvPr/>
         </p:nvSpPr>
         <p:spPr>
           <a:xfrm>
             <a:off x="578160" y="34560"/>
-            <a:ext cx="10797840" cy="1261440"/>
+            <a:ext cx="10797480" cy="1261080"/>
           </a:xfrm>
           <a:prstGeom prst="rect">
             <a:avLst/>
@@ -5187,10 +5399,20 @@
             <a:noFill/>
           </a:ln>
         </p:spPr>
+        <p:style>
+          <a:lnRef idx="0"/>
+          <a:fillRef idx="0"/>
+          <a:effectRef idx="0"/>
+          <a:fontRef idx="minor"/>
+        </p:style>
         <p:txBody>
           <a:bodyPr lIns="0" rIns="0" tIns="0" bIns="0" anchor="ctr"/>
           <a:p>
-            <a:pPr algn="ctr"/>
+            <a:pPr algn="ctr">
+              <a:lnSpc>
+                <a:spcPct val="100000"/>
+              </a:lnSpc>
+            </a:pPr>
             <a:r>
               <a:rPr b="0" lang="ru-RU" sz="4400" spc="-1" strike="noStrike">
                 <a:latin typeface="Arial"/>
@@ -5205,14 +5427,14 @@
       </p:sp>
       <p:sp>
         <p:nvSpPr>
-          <p:cNvPr id="59" name="TextShape 2"/>
-          <p:cNvSpPr txBox="1"/>
+          <p:cNvPr id="59" name="CustomShape 2"/>
+          <p:cNvSpPr/>
           <p:nvPr/>
         </p:nvSpPr>
         <p:spPr>
           <a:xfrm>
             <a:off x="360000" y="5400000"/>
-            <a:ext cx="10797840" cy="1261440"/>
+            <a:ext cx="10797480" cy="1261080"/>
           </a:xfrm>
           <a:prstGeom prst="rect">
             <a:avLst/>
@@ -5222,6 +5444,12 @@
             <a:noFill/>
           </a:ln>
         </p:spPr>
+        <p:style>
+          <a:lnRef idx="0"/>
+          <a:fillRef idx="0"/>
+          <a:effectRef idx="0"/>
+          <a:fontRef idx="minor"/>
+        </p:style>
         <p:txBody>
           <a:bodyPr lIns="0" rIns="0" tIns="0" bIns="0" anchor="ctr"/>
           <a:p>
@@ -5229,7 +5457,7 @@
               <a:rPr b="0" lang="ru-RU" sz="2800" spc="-1" strike="noStrike">
                 <a:latin typeface="Arial"/>
               </a:rPr>
-              <a:t>Введение в промышленное программирование</a:t>
+              <a:t>Основы разработки корпоративных систем на платформе .NET</a:t>
             </a:r>
             <a:endParaRPr b="0" lang="ru-RU" sz="2800" spc="-1" strike="noStrike">
               <a:latin typeface="Arial"/>
@@ -5250,7 +5478,7 @@
         <p:spPr>
           <a:xfrm>
             <a:off x="3240000" y="1149120"/>
-            <a:ext cx="5319720" cy="3818880"/>
+            <a:ext cx="5319360" cy="3818520"/>
           </a:xfrm>
           <a:prstGeom prst="rect">
             <a:avLst/>
@@ -5262,14 +5490,14 @@
       </p:pic>
       <p:sp>
         <p:nvSpPr>
-          <p:cNvPr id="61" name="TextShape 3"/>
-          <p:cNvSpPr txBox="1"/>
+          <p:cNvPr id="61" name="CustomShape 3"/>
+          <p:cNvSpPr/>
           <p:nvPr/>
         </p:nvSpPr>
         <p:spPr>
           <a:xfrm>
             <a:off x="2360880" y="5112000"/>
-            <a:ext cx="7575120" cy="346680"/>
+            <a:ext cx="7574760" cy="346320"/>
           </a:xfrm>
           <a:prstGeom prst="rect">
             <a:avLst/>
@@ -5279,6 +5507,12 @@
             <a:noFill/>
           </a:ln>
         </p:spPr>
+        <p:style>
+          <a:lnRef idx="0"/>
+          <a:fillRef idx="0"/>
+          <a:effectRef idx="0"/>
+          <a:fontRef idx="minor"/>
+        </p:style>
         <p:txBody>
           <a:bodyPr lIns="90000" rIns="90000" tIns="45000" bIns="45000"/>
           <a:p>
@@ -5345,14 +5579,14 @@
       </p:grpSpPr>
       <p:sp>
         <p:nvSpPr>
-          <p:cNvPr id="62" name="TextShape 1"/>
-          <p:cNvSpPr txBox="1"/>
+          <p:cNvPr id="62" name="CustomShape 1"/>
+          <p:cNvSpPr/>
           <p:nvPr/>
         </p:nvSpPr>
         <p:spPr>
           <a:xfrm>
             <a:off x="578160" y="34560"/>
-            <a:ext cx="10797840" cy="1261440"/>
+            <a:ext cx="10797480" cy="1261080"/>
           </a:xfrm>
           <a:prstGeom prst="rect">
             <a:avLst/>
@@ -5362,10 +5596,20 @@
             <a:noFill/>
           </a:ln>
         </p:spPr>
+        <p:style>
+          <a:lnRef idx="0"/>
+          <a:fillRef idx="0"/>
+          <a:effectRef idx="0"/>
+          <a:fontRef idx="minor"/>
+        </p:style>
         <p:txBody>
           <a:bodyPr lIns="0" rIns="0" tIns="0" bIns="0" anchor="ctr"/>
           <a:p>
-            <a:pPr algn="ctr"/>
+            <a:pPr algn="ctr">
+              <a:lnSpc>
+                <a:spcPct val="100000"/>
+              </a:lnSpc>
+            </a:pPr>
             <a:r>
               <a:rPr b="0" lang="ru-RU" sz="4400" spc="-1" strike="noStrike">
                 <a:latin typeface="Arial"/>
@@ -5380,14 +5624,14 @@
       </p:sp>
       <p:sp>
         <p:nvSpPr>
-          <p:cNvPr id="63" name="TextShape 2"/>
-          <p:cNvSpPr txBox="1"/>
+          <p:cNvPr id="63" name="CustomShape 2"/>
+          <p:cNvSpPr/>
           <p:nvPr/>
         </p:nvSpPr>
         <p:spPr>
           <a:xfrm>
             <a:off x="360000" y="5400000"/>
-            <a:ext cx="10797840" cy="1261440"/>
+            <a:ext cx="10797480" cy="1261080"/>
           </a:xfrm>
           <a:prstGeom prst="rect">
             <a:avLst/>
@@ -5397,6 +5641,12 @@
             <a:noFill/>
           </a:ln>
         </p:spPr>
+        <p:style>
+          <a:lnRef idx="0"/>
+          <a:fillRef idx="0"/>
+          <a:effectRef idx="0"/>
+          <a:fontRef idx="minor"/>
+        </p:style>
         <p:txBody>
           <a:bodyPr lIns="0" rIns="0" tIns="0" bIns="0" anchor="ctr"/>
           <a:p>
@@ -5404,7 +5654,7 @@
               <a:rPr b="0" lang="ru-RU" sz="2800" spc="-1" strike="noStrike">
                 <a:latin typeface="Arial"/>
               </a:rPr>
-              <a:t>Введение в промышленное программирование</a:t>
+              <a:t>Основы разработки корпоративных систем на платформе .NET</a:t>
             </a:r>
             <a:endParaRPr b="0" lang="ru-RU" sz="2800" spc="-1" strike="noStrike">
               <a:latin typeface="Arial"/>
@@ -5414,14 +5664,14 @@
       </p:sp>
       <p:sp>
         <p:nvSpPr>
-          <p:cNvPr id="64" name="TextShape 3"/>
-          <p:cNvSpPr txBox="1"/>
+          <p:cNvPr id="64" name="CustomShape 3"/>
+          <p:cNvSpPr/>
           <p:nvPr/>
         </p:nvSpPr>
         <p:spPr>
           <a:xfrm>
             <a:off x="936000" y="1244520"/>
-            <a:ext cx="6470280" cy="2313000"/>
+            <a:ext cx="6469920" cy="2312640"/>
           </a:xfrm>
           <a:prstGeom prst="rect">
             <a:avLst/>
@@ -5431,10 +5681,16 @@
             <a:noFill/>
           </a:ln>
         </p:spPr>
+        <p:style>
+          <a:lnRef idx="0"/>
+          <a:fillRef idx="0"/>
+          <a:effectRef idx="0"/>
+          <a:fontRef idx="minor"/>
+        </p:style>
         <p:txBody>
           <a:bodyPr lIns="90000" rIns="90000" tIns="45000" bIns="45000"/>
           <a:p>
-            <a:pPr marL="216000" indent="-216000">
+            <a:pPr marL="216000" indent="-215640">
               <a:lnSpc>
                 <a:spcPct val="150000"/>
               </a:lnSpc>
@@ -5459,7 +5715,7 @@
             </a:endParaRPr>
           </a:p>
           <a:p>
-            <a:pPr marL="216000" indent="-216000">
+            <a:pPr marL="216000" indent="-215640">
               <a:lnSpc>
                 <a:spcPct val="150000"/>
               </a:lnSpc>
@@ -5484,7 +5740,7 @@
             </a:endParaRPr>
           </a:p>
           <a:p>
-            <a:pPr marL="216000" indent="-216000">
+            <a:pPr marL="216000" indent="-215640">
               <a:lnSpc>
                 <a:spcPct val="150000"/>
               </a:lnSpc>
@@ -5509,7 +5765,7 @@
             </a:endParaRPr>
           </a:p>
           <a:p>
-            <a:pPr marL="216000" indent="-216000">
+            <a:pPr marL="216000" indent="-215640">
               <a:lnSpc>
                 <a:spcPct val="150000"/>
               </a:lnSpc>
@@ -5535,7 +5791,7 @@
             </a:endParaRPr>
           </a:p>
           <a:p>
-            <a:pPr marL="216000" indent="-216000">
+            <a:pPr marL="216000" indent="-215640">
               <a:lnSpc>
                 <a:spcPct val="150000"/>
               </a:lnSpc>
@@ -5552,6 +5808,7 @@
                   <a:srgbClr val="000000"/>
                 </a:solidFill>
                 <a:latin typeface="Open Sans"/>
+                <a:ea typeface="Microsoft YaHei"/>
               </a:rPr>
               <a:t>Для установки на сервер называется Team Foundation Server</a:t>
             </a:r>
@@ -5560,7 +5817,7 @@
             </a:endParaRPr>
           </a:p>
           <a:p>
-            <a:pPr marL="216000" indent="-216000">
+            <a:pPr marL="216000" indent="-215640">
               <a:lnSpc>
                 <a:spcPct val="150000"/>
               </a:lnSpc>
@@ -5577,6 +5834,7 @@
                   <a:srgbClr val="000000"/>
                 </a:solidFill>
                 <a:latin typeface="Open Sans"/>
+                <a:ea typeface="Microsoft YaHei"/>
               </a:rPr>
               <a:t>Бесплатный тариф до 5 участников проекта</a:t>
             </a:r>
@@ -5585,7 +5843,7 @@
             </a:endParaRPr>
           </a:p>
           <a:p>
-            <a:pPr marL="216000" indent="-216000">
+            <a:pPr marL="216000" indent="-215640">
               <a:lnSpc>
                 <a:spcPct val="150000"/>
               </a:lnSpc>
@@ -5602,6 +5860,7 @@
                   <a:srgbClr val="000000"/>
                 </a:solidFill>
                 <a:latin typeface="Open Sans"/>
+                <a:ea typeface="Microsoft YaHei"/>
               </a:rPr>
               <a:t>Task tracker, Builds, CI/CD, Pull Requests, Wiki, Service Hooks,…</a:t>
             </a:r>

</xml_diff>

<commit_message>
added schedule to pptx
</commit_message>
<xml_diff>
--- a/docs/ЛЭТИ ВвПП 2019.1.pptx
+++ b/docs/ЛЭТИ ВвПП 2019.1.pptx
@@ -17,6 +17,8 @@
     <p:sldId id="265" r:id="rId12"/>
     <p:sldId id="266" r:id="rId13"/>
     <p:sldId id="267" r:id="rId14"/>
+    <p:sldId id="268" r:id="rId15"/>
+    <p:sldId id="269" r:id="rId16"/>
   </p:sldIdLst>
   <p:sldSz cx="11998325" cy="7559675"/>
   <p:notesSz cx="7559675" cy="10691812"/>
@@ -2303,7 +2305,7 @@
               <a:rPr b="0" lang="ru-RU" sz="4400" spc="-1" strike="noStrike">
                 <a:latin typeface="Arial"/>
               </a:rPr>
-              <a:t>Домашнее задание</a:t>
+              <a:t>Лекции</a:t>
             </a:r>
             <a:endParaRPr b="0" lang="ru-RU" sz="4400" spc="-1" strike="noStrike">
               <a:latin typeface="Arial"/>
@@ -2319,8 +2321,8 @@
         </p:nvSpPr>
         <p:spPr>
           <a:xfrm>
-            <a:off x="360000" y="5400000"/>
-            <a:ext cx="10797480" cy="1261080"/>
+            <a:off x="578160" y="921600"/>
+            <a:ext cx="6800760" cy="3774960"/>
           </a:xfrm>
           <a:prstGeom prst="rect">
             <a:avLst/>
@@ -2336,20 +2338,6 @@
           <a:effectRef idx="0"/>
           <a:fontRef idx="minor"/>
         </p:style>
-        <p:txBody>
-          <a:bodyPr lIns="0" rIns="0" tIns="0" bIns="0" anchor="ctr"/>
-          <a:p>
-            <a:r>
-              <a:rPr b="0" lang="ru-RU" sz="2800" spc="-1" strike="noStrike">
-                <a:latin typeface="Arial"/>
-              </a:rPr>
-              <a:t>Основы разработки корпоративных систем на платформе .NET</a:t>
-            </a:r>
-            <a:endParaRPr b="0" lang="ru-RU" sz="2800" spc="-1" strike="noStrike">
-              <a:latin typeface="Arial"/>
-            </a:endParaRPr>
-          </a:p>
-        </p:txBody>
       </p:sp>
       <p:sp>
         <p:nvSpPr>
@@ -2359,8 +2347,8 @@
         </p:nvSpPr>
         <p:spPr>
           <a:xfrm>
-            <a:off x="802080" y="1152000"/>
-            <a:ext cx="6469920" cy="3795840"/>
+            <a:off x="360000" y="5400000"/>
+            <a:ext cx="10797480" cy="1261080"/>
           </a:xfrm>
           <a:prstGeom prst="rect">
             <a:avLst/>
@@ -2377,301 +2365,342 @@
           <a:fontRef idx="minor"/>
         </p:style>
         <p:txBody>
+          <a:bodyPr lIns="0" rIns="0" tIns="0" bIns="0" anchor="ctr"/>
+          <a:p>
+            <a:r>
+              <a:rPr b="0" lang="ru-RU" sz="2800" spc="-1" strike="noStrike">
+                <a:latin typeface="Arial"/>
+              </a:rPr>
+              <a:t>Основы разработки корпоративных систем на платформе .NET</a:t>
+            </a:r>
+            <a:endParaRPr b="0" lang="ru-RU" sz="2800" spc="-1" strike="noStrike">
+              <a:latin typeface="Arial"/>
+            </a:endParaRPr>
+          </a:p>
+        </p:txBody>
+      </p:sp>
+      <p:sp>
+        <p:nvSpPr>
+          <p:cNvPr id="71" name="TextShape 4"/>
+          <p:cNvSpPr txBox="1"/>
+          <p:nvPr/>
+        </p:nvSpPr>
+        <p:spPr>
+          <a:xfrm>
+            <a:off x="1924200" y="1008000"/>
+            <a:ext cx="8731800" cy="3927960"/>
+          </a:xfrm>
+          <a:prstGeom prst="rect">
+            <a:avLst/>
+          </a:prstGeom>
+          <a:noFill/>
+          <a:ln>
+            <a:noFill/>
+          </a:ln>
+        </p:spPr>
+        <p:txBody>
           <a:bodyPr lIns="90000" rIns="90000" tIns="45000" bIns="45000"/>
           <a:p>
-            <a:pPr marL="216000" indent="-215640">
-              <a:lnSpc>
-                <a:spcPct val="100000"/>
-              </a:lnSpc>
-              <a:spcBef>
-                <a:spcPts val="451"/>
-              </a:spcBef>
-              <a:spcAft>
-                <a:spcPts val="451"/>
-              </a:spcAft>
-              <a:buClr>
-                <a:srgbClr val="000000"/>
-              </a:buClr>
-              <a:buSzPct val="45000"/>
-              <a:buFont typeface="Wingdings" charset="2"/>
-              <a:buChar char=""/>
-            </a:pPr>
-            <a:r>
-              <a:rPr b="0" lang="ru-RU" sz="1500" spc="-1" strike="noStrike">
-                <a:solidFill>
-                  <a:srgbClr val="000000"/>
-                </a:solidFill>
-                <a:latin typeface="Open Sans"/>
-              </a:rPr>
-              <a:t>Создать проект (Agile/Git) на visualstudio.com</a:t>
-            </a:r>
-            <a:endParaRPr b="0" lang="ru-RU" sz="1500" spc="-1" strike="noStrike">
-              <a:latin typeface="Arial"/>
-            </a:endParaRPr>
-          </a:p>
-          <a:p>
-            <a:pPr marL="216000" indent="-215640">
-              <a:lnSpc>
-                <a:spcPct val="100000"/>
-              </a:lnSpc>
-              <a:spcBef>
-                <a:spcPts val="451"/>
-              </a:spcBef>
-              <a:spcAft>
-                <a:spcPts val="451"/>
-              </a:spcAft>
-              <a:buClr>
-                <a:srgbClr val="000000"/>
-              </a:buClr>
-              <a:buSzPct val="45000"/>
-              <a:buFont typeface="Wingdings" charset="2"/>
-              <a:buChar char=""/>
-            </a:pPr>
-            <a:r>
-              <a:rPr b="0" lang="ru-RU" sz="1500" spc="-1" strike="noStrike">
-                <a:solidFill>
-                  <a:srgbClr val="000000"/>
-                </a:solidFill>
-                <a:latin typeface="Open Sans"/>
-              </a:rPr>
-              <a:t>(Для домашних заданий) Установить себе:</a:t>
-            </a:r>
-            <a:endParaRPr b="0" lang="ru-RU" sz="1500" spc="-1" strike="noStrike">
-              <a:latin typeface="Arial"/>
-            </a:endParaRPr>
-          </a:p>
-          <a:p>
-            <a:pPr marL="216000" indent="-215640">
-              <a:lnSpc>
-                <a:spcPct val="100000"/>
-              </a:lnSpc>
-              <a:spcBef>
-                <a:spcPts val="451"/>
-              </a:spcBef>
-              <a:spcAft>
-                <a:spcPts val="451"/>
-              </a:spcAft>
-              <a:buClr>
-                <a:srgbClr val="000000"/>
-              </a:buClr>
-              <a:buFont typeface="StarSymbol"/>
-              <a:buAutoNum type="arabicParenR"/>
-            </a:pPr>
-            <a:r>
-              <a:rPr b="0" lang="ru-RU" sz="1400" spc="-1" strike="noStrike">
-                <a:solidFill>
-                  <a:srgbClr val="000000"/>
-                </a:solidFill>
-                <a:latin typeface="Open Sans"/>
-              </a:rPr>
-              <a:t>VS 2017 Community Edition</a:t>
-            </a:r>
-            <a:endParaRPr b="0" lang="ru-RU" sz="1400" spc="-1" strike="noStrike">
-              <a:latin typeface="Arial"/>
-            </a:endParaRPr>
-          </a:p>
-          <a:p>
-            <a:pPr marL="216000" indent="-215640">
-              <a:lnSpc>
-                <a:spcPct val="100000"/>
-              </a:lnSpc>
-              <a:spcBef>
-                <a:spcPts val="451"/>
-              </a:spcBef>
-              <a:spcAft>
-                <a:spcPts val="451"/>
-              </a:spcAft>
-              <a:buClr>
-                <a:srgbClr val="000000"/>
-              </a:buClr>
-              <a:buFont typeface="StarSymbol"/>
-              <a:buAutoNum type="arabicParenR"/>
-            </a:pPr>
-            <a:r>
-              <a:rPr b="0" lang="ru-RU" sz="1400" spc="-1" strike="noStrike">
-                <a:solidFill>
-                  <a:srgbClr val="000000"/>
-                </a:solidFill>
-                <a:latin typeface="Open Sans"/>
-              </a:rPr>
-              <a:t>ReSharper и получить на него студенческую лицензию</a:t>
-            </a:r>
-            <a:endParaRPr b="0" lang="ru-RU" sz="1400" spc="-1" strike="noStrike">
-              <a:latin typeface="Arial"/>
-            </a:endParaRPr>
-          </a:p>
-          <a:p>
-            <a:pPr marL="216000" indent="-215640">
-              <a:lnSpc>
-                <a:spcPct val="100000"/>
-              </a:lnSpc>
-              <a:spcBef>
-                <a:spcPts val="451"/>
-              </a:spcBef>
-              <a:spcAft>
-                <a:spcPts val="451"/>
-              </a:spcAft>
-              <a:buClr>
-                <a:srgbClr val="000000"/>
-              </a:buClr>
-              <a:buFont typeface="StarSymbol"/>
-              <a:buAutoNum type="arabicParenR"/>
-            </a:pPr>
-            <a:r>
-              <a:rPr b="0" lang="ru-RU" sz="1400" spc="-1" strike="noStrike">
-                <a:solidFill>
-                  <a:srgbClr val="000000"/>
-                </a:solidFill>
-                <a:latin typeface="Open Sans"/>
-              </a:rPr>
-              <a:t>Git Extension</a:t>
-            </a:r>
-            <a:endParaRPr b="0" lang="ru-RU" sz="1400" spc="-1" strike="noStrike">
-              <a:latin typeface="Arial"/>
-            </a:endParaRPr>
-          </a:p>
-          <a:p>
-            <a:pPr marL="216000" indent="-215640">
-              <a:lnSpc>
-                <a:spcPct val="100000"/>
-              </a:lnSpc>
-              <a:spcBef>
-                <a:spcPts val="451"/>
-              </a:spcBef>
-              <a:spcAft>
-                <a:spcPts val="451"/>
-              </a:spcAft>
-              <a:buClr>
-                <a:srgbClr val="000000"/>
-              </a:buClr>
-              <a:buFont typeface="StarSymbol"/>
-              <a:buAutoNum type="arabicParenR"/>
-            </a:pPr>
-            <a:r>
-              <a:rPr b="0" lang="ru-RU" sz="1400" spc="-1" strike="noStrike">
-                <a:solidFill>
-                  <a:srgbClr val="000000"/>
-                </a:solidFill>
-                <a:latin typeface="Open Sans"/>
-              </a:rPr>
-              <a:t>Productivity Power Tools (по желанию)</a:t>
-            </a:r>
-            <a:endParaRPr b="0" lang="ru-RU" sz="1400" spc="-1" strike="noStrike">
-              <a:latin typeface="Arial"/>
-            </a:endParaRPr>
-          </a:p>
-          <a:p>
-            <a:pPr marL="216000" indent="-215640">
-              <a:lnSpc>
-                <a:spcPct val="100000"/>
-              </a:lnSpc>
-              <a:spcBef>
-                <a:spcPts val="451"/>
-              </a:spcBef>
-              <a:spcAft>
-                <a:spcPts val="451"/>
-              </a:spcAft>
-              <a:buClr>
-                <a:srgbClr val="000000"/>
-              </a:buClr>
-              <a:buSzPct val="45000"/>
-              <a:buFont typeface="Wingdings" charset="2"/>
-              <a:buChar char=""/>
-            </a:pPr>
-            <a:r>
-              <a:rPr b="0" lang="ru-RU" sz="1500" spc="-1" strike="noStrike">
-                <a:solidFill>
-                  <a:srgbClr val="000000"/>
-                </a:solidFill>
-                <a:latin typeface="Open Sans"/>
-              </a:rPr>
-              <a:t>Решить три простые задачи, решения залить в Git:</a:t>
-            </a:r>
-            <a:endParaRPr b="0" lang="ru-RU" sz="1500" spc="-1" strike="noStrike">
-              <a:latin typeface="Arial"/>
-            </a:endParaRPr>
-          </a:p>
-          <a:p>
-            <a:pPr marL="216000" indent="-215640">
-              <a:lnSpc>
-                <a:spcPct val="100000"/>
-              </a:lnSpc>
-              <a:spcBef>
-                <a:spcPts val="451"/>
-              </a:spcBef>
-              <a:spcAft>
-                <a:spcPts val="451"/>
-              </a:spcAft>
-              <a:buClr>
-                <a:srgbClr val="000000"/>
-              </a:buClr>
-              <a:buFont typeface="StarSymbol"/>
-              <a:buAutoNum type="arabicParenR"/>
-            </a:pPr>
-            <a:r>
-              <a:rPr b="0" lang="ru-RU" sz="1400" spc="-1" strike="noStrike">
-                <a:solidFill>
-                  <a:srgbClr val="000000"/>
-                </a:solidFill>
-                <a:latin typeface="Open Sans"/>
-              </a:rPr>
-              <a:t>Реализовать связный список: создание, удаление, добавление произвольных элементов, реверс списка - без использования стандартных коллекций/LINQ (только IEnumerable)</a:t>
-            </a:r>
-            <a:endParaRPr b="0" lang="ru-RU" sz="1400" spc="-1" strike="noStrike">
-              <a:latin typeface="Arial"/>
-            </a:endParaRPr>
-          </a:p>
-          <a:p>
-            <a:pPr marL="216000" indent="-215640">
-              <a:lnSpc>
-                <a:spcPct val="100000"/>
-              </a:lnSpc>
-              <a:spcBef>
-                <a:spcPts val="451"/>
-              </a:spcBef>
-              <a:spcAft>
-                <a:spcPts val="451"/>
-              </a:spcAft>
-              <a:buClr>
-                <a:srgbClr val="000000"/>
-              </a:buClr>
-              <a:buFont typeface="StarSymbol"/>
-              <a:buAutoNum type="arabicParenR"/>
-            </a:pPr>
-            <a:r>
-              <a:rPr b="0" lang="ru-RU" sz="1400" spc="-1" strike="noStrike">
-                <a:solidFill>
-                  <a:srgbClr val="000000"/>
-                </a:solidFill>
-                <a:latin typeface="Open Sans"/>
-              </a:rPr>
-              <a:t>Реализовать бинарное дерево: заполнение, поиск, удаление элемента - без использования стандартных деревьев</a:t>
-            </a:r>
-            <a:endParaRPr b="0" lang="ru-RU" sz="1400" spc="-1" strike="noStrike">
-              <a:latin typeface="Arial"/>
-            </a:endParaRPr>
-          </a:p>
-          <a:p>
-            <a:pPr marL="216000" indent="-215640">
+            <a:pPr>
               <a:lnSpc>
                 <a:spcPct val="150000"/>
               </a:lnSpc>
-              <a:buClr>
-                <a:srgbClr val="000000"/>
-              </a:buClr>
-              <a:buFont typeface="StarSymbol"/>
-              <a:buAutoNum type="arabicParenR"/>
-            </a:pPr>
-            <a:r>
-              <a:rPr b="0" lang="ru-RU" sz="1400" spc="-1" strike="noStrike">
-                <a:solidFill>
-                  <a:srgbClr val="000000"/>
-                </a:solidFill>
-                <a:latin typeface="Open Sans"/>
-              </a:rPr>
-              <a:t>Реализовать сортировку вставками - без .OrderBy() :)</a:t>
-            </a:r>
-            <a:endParaRPr b="0" lang="ru-RU" sz="1400" spc="-1" strike="noStrike">
+            </a:pPr>
+            <a:r>
+              <a:rPr b="0" lang="ru-RU" sz="1800" spc="-1" strike="noStrike">
+                <a:latin typeface="Arial"/>
+              </a:rPr>
+              <a:t>7.02</a:t>
+            </a:r>
+            <a:r>
+              <a:rPr b="0" lang="ru-RU" sz="1800" spc="-1" strike="noStrike">
+                <a:latin typeface="Arial"/>
+              </a:rPr>
+              <a:t>	</a:t>
+            </a:r>
+            <a:r>
+              <a:rPr b="0" lang="ru-RU" sz="1800" spc="-1" strike="noStrike">
+                <a:latin typeface="Arial"/>
+              </a:rPr>
+              <a:t>	</a:t>
+            </a:r>
+            <a:r>
+              <a:rPr b="0" lang="ru-RU" sz="1800" spc="-1" strike="noStrike">
+                <a:latin typeface="Arial"/>
+              </a:rPr>
+              <a:t>Тестовое задание на базовый уровень (3 простых задачи) </a:t>
+            </a:r>
+            <a:endParaRPr b="0" lang="ru-RU" sz="1800" spc="-1" strike="noStrike">
+              <a:latin typeface="Arial"/>
+            </a:endParaRPr>
+          </a:p>
+          <a:p>
+            <a:pPr>
+              <a:lnSpc>
+                <a:spcPct val="150000"/>
+              </a:lnSpc>
+            </a:pPr>
+            <a:r>
+              <a:rPr b="0" lang="ru-RU" sz="1800" spc="-1" strike="noStrike">
+                <a:latin typeface="Arial"/>
+              </a:rPr>
+              <a:t>10.02</a:t>
+            </a:r>
+            <a:r>
+              <a:rPr b="0" lang="ru-RU" sz="1800" spc="-1" strike="noStrike">
+                <a:latin typeface="Arial"/>
+              </a:rPr>
+              <a:t>	</a:t>
+            </a:r>
+            <a:r>
+              <a:rPr b="0" lang="ru-RU" sz="1800" spc="-1" strike="noStrike">
+                <a:latin typeface="Arial"/>
+              </a:rPr>
+              <a:t>Разработка бизнес-логики клиент-серверного приложения </a:t>
+            </a:r>
+            <a:endParaRPr b="0" lang="ru-RU" sz="1800" spc="-1" strike="noStrike">
+              <a:latin typeface="Arial"/>
+            </a:endParaRPr>
+          </a:p>
+          <a:p>
+            <a:pPr>
+              <a:lnSpc>
+                <a:spcPct val="150000"/>
+              </a:lnSpc>
+            </a:pPr>
+            <a:r>
+              <a:rPr b="0" lang="ru-RU" sz="1800" spc="-1" strike="noStrike">
+                <a:latin typeface="Arial"/>
+              </a:rPr>
+              <a:t>17.02</a:t>
+            </a:r>
+            <a:r>
+              <a:rPr b="0" lang="ru-RU" sz="1800" spc="-1" strike="noStrike">
+                <a:latin typeface="Arial"/>
+              </a:rPr>
+              <a:t>	</a:t>
+            </a:r>
+            <a:r>
+              <a:rPr b="0" lang="ru-RU" sz="1800" spc="-1" strike="noStrike">
+                <a:latin typeface="Arial"/>
+              </a:rPr>
+              <a:t>Разработка слоя работы с БД </a:t>
+            </a:r>
+            <a:endParaRPr b="0" lang="ru-RU" sz="1800" spc="-1" strike="noStrike">
+              <a:latin typeface="Arial"/>
+            </a:endParaRPr>
+          </a:p>
+          <a:p>
+            <a:pPr>
+              <a:lnSpc>
+                <a:spcPct val="150000"/>
+              </a:lnSpc>
+            </a:pPr>
+            <a:r>
+              <a:rPr b="0" lang="ru-RU" sz="1800" spc="-1" strike="noStrike">
+                <a:latin typeface="Arial"/>
+              </a:rPr>
+              <a:t>24.02</a:t>
+            </a:r>
+            <a:r>
+              <a:rPr b="0" lang="ru-RU" sz="1800" spc="-1" strike="noStrike">
+                <a:latin typeface="Arial"/>
+              </a:rPr>
+              <a:t>	</a:t>
+            </a:r>
+            <a:r>
+              <a:rPr b="0" lang="ru-RU" sz="1800" spc="-1" strike="noStrike">
+                <a:latin typeface="Arial"/>
+              </a:rPr>
+              <a:t>ВЫХОДНОЙ</a:t>
+            </a:r>
+            <a:endParaRPr b="0" lang="ru-RU" sz="1800" spc="-1" strike="noStrike">
+              <a:latin typeface="Arial"/>
+            </a:endParaRPr>
+          </a:p>
+          <a:p>
+            <a:pPr>
+              <a:lnSpc>
+                <a:spcPct val="150000"/>
+              </a:lnSpc>
+            </a:pPr>
+            <a:r>
+              <a:rPr b="0" lang="ru-RU" sz="1800" spc="-1" strike="noStrike">
+                <a:latin typeface="Arial"/>
+              </a:rPr>
+              <a:t>2.03</a:t>
+            </a:r>
+            <a:r>
+              <a:rPr b="0" lang="ru-RU" sz="1800" spc="-1" strike="noStrike">
+                <a:latin typeface="Arial"/>
+              </a:rPr>
+              <a:t>	</a:t>
+            </a:r>
+            <a:r>
+              <a:rPr b="0" lang="ru-RU" sz="1800" spc="-1" strike="noStrike">
+                <a:latin typeface="Arial"/>
+              </a:rPr>
+              <a:t>	</a:t>
+            </a:r>
+            <a:r>
+              <a:rPr b="0" lang="ru-RU" sz="1800" spc="-1" strike="noStrike">
+                <a:latin typeface="Arial"/>
+              </a:rPr>
+              <a:t>Разработка Web API сервисов </a:t>
+            </a:r>
+            <a:endParaRPr b="0" lang="ru-RU" sz="1800" spc="-1" strike="noStrike">
+              <a:latin typeface="Arial"/>
+            </a:endParaRPr>
+          </a:p>
+          <a:p>
+            <a:pPr>
+              <a:lnSpc>
+                <a:spcPct val="150000"/>
+              </a:lnSpc>
+            </a:pPr>
+            <a:r>
+              <a:rPr b="0" lang="ru-RU" sz="1800" spc="-1" strike="noStrike">
+                <a:latin typeface="Arial"/>
+              </a:rPr>
+              <a:t>9.03</a:t>
+            </a:r>
+            <a:r>
+              <a:rPr b="0" lang="ru-RU" sz="1800" spc="-1" strike="noStrike">
+                <a:latin typeface="Arial"/>
+              </a:rPr>
+              <a:t>	</a:t>
+            </a:r>
+            <a:r>
+              <a:rPr b="0" lang="ru-RU" sz="1800" spc="-1" strike="noStrike">
+                <a:latin typeface="Arial"/>
+              </a:rPr>
+              <a:t>	</a:t>
+            </a:r>
+            <a:r>
+              <a:rPr b="0" lang="ru-RU" sz="1800" spc="-1" strike="noStrike">
+                <a:latin typeface="Arial"/>
+              </a:rPr>
+              <a:t>ВЫХОДНОЙ</a:t>
+            </a:r>
+            <a:endParaRPr b="0" lang="ru-RU" sz="1800" spc="-1" strike="noStrike">
+              <a:latin typeface="Arial"/>
+            </a:endParaRPr>
+          </a:p>
+          <a:p>
+            <a:pPr>
+              <a:lnSpc>
+                <a:spcPct val="150000"/>
+              </a:lnSpc>
+            </a:pPr>
+            <a:r>
+              <a:rPr b="0" lang="ru-RU" sz="1800" spc="-1" strike="noStrike">
+                <a:latin typeface="Arial"/>
+              </a:rPr>
+              <a:t>16.03</a:t>
+            </a:r>
+            <a:r>
+              <a:rPr b="0" lang="ru-RU" sz="1800" spc="-1" strike="noStrike">
+                <a:latin typeface="Arial"/>
+              </a:rPr>
+              <a:t>	</a:t>
+            </a:r>
+            <a:r>
+              <a:rPr b="0" lang="ru-RU" sz="1800" spc="-1" strike="noStrike">
+                <a:latin typeface="Arial"/>
+              </a:rPr>
+              <a:t>Разработка Web API сервисов </a:t>
+            </a:r>
+            <a:endParaRPr b="0" lang="ru-RU" sz="1800" spc="-1" strike="noStrike">
+              <a:latin typeface="Arial"/>
+            </a:endParaRPr>
+          </a:p>
+          <a:p>
+            <a:pPr>
+              <a:lnSpc>
+                <a:spcPct val="150000"/>
+              </a:lnSpc>
+            </a:pPr>
+            <a:r>
+              <a:rPr b="0" lang="ru-RU" sz="1800" spc="-1" strike="noStrike">
+                <a:latin typeface="Arial"/>
+              </a:rPr>
+              <a:t>23.03</a:t>
+            </a:r>
+            <a:r>
+              <a:rPr b="0" lang="ru-RU" sz="1800" spc="-1" strike="noStrike">
+                <a:latin typeface="Arial"/>
+              </a:rPr>
+              <a:t>	</a:t>
+            </a:r>
+            <a:r>
+              <a:rPr b="0" lang="ru-RU" sz="1800" spc="-1" strike="noStrike">
+                <a:latin typeface="Arial"/>
+              </a:rPr>
+              <a:t>Разработка ASP.NET MVC приложения для работы с Web API </a:t>
+            </a:r>
+            <a:endParaRPr b="0" lang="ru-RU" sz="1800" spc="-1" strike="noStrike">
+              <a:latin typeface="Arial"/>
+            </a:endParaRPr>
+          </a:p>
+          <a:p>
+            <a:pPr>
+              <a:lnSpc>
+                <a:spcPct val="150000"/>
+              </a:lnSpc>
+            </a:pPr>
+            <a:r>
+              <a:rPr b="0" lang="ru-RU" sz="1800" spc="-1" strike="noStrike">
+                <a:latin typeface="Arial"/>
+              </a:rPr>
+              <a:t>30.03</a:t>
+            </a:r>
+            <a:r>
+              <a:rPr b="0" lang="ru-RU" sz="1800" spc="-1" strike="noStrike">
+                <a:latin typeface="Arial"/>
+              </a:rPr>
+              <a:t>	</a:t>
+            </a:r>
+            <a:r>
+              <a:rPr b="0" lang="ru-RU" sz="1800" spc="-1" strike="noStrike">
+                <a:latin typeface="Arial"/>
+              </a:rPr>
+              <a:t>Тест (10 вопросов, 4 варианта в каждом, 1 правильный) </a:t>
+            </a:r>
+            <a:endParaRPr b="0" lang="ru-RU" sz="1800" spc="-1" strike="noStrike">
+              <a:latin typeface="Arial"/>
+            </a:endParaRPr>
+          </a:p>
+          <a:p>
+            <a:pPr>
+              <a:lnSpc>
+                <a:spcPct val="150000"/>
+              </a:lnSpc>
+            </a:pPr>
+            <a:r>
+              <a:rPr b="0" lang="ru-RU" sz="1800" spc="-1" strike="noStrike">
+                <a:latin typeface="Arial"/>
+              </a:rPr>
+              <a:t>6.04</a:t>
+            </a:r>
+            <a:r>
+              <a:rPr b="0" lang="ru-RU" sz="1800" spc="-1" strike="noStrike">
+                <a:latin typeface="Arial"/>
+              </a:rPr>
+              <a:t>	</a:t>
+            </a:r>
+            <a:r>
+              <a:rPr b="0" lang="ru-RU" sz="1800" spc="-1" strike="noStrike">
+                <a:latin typeface="Arial"/>
+              </a:rPr>
+              <a:t>	</a:t>
+            </a:r>
+            <a:r>
+              <a:rPr b="0" lang="ru-RU" sz="1800" spc="-1" strike="noStrike">
+                <a:latin typeface="Arial"/>
+              </a:rPr>
+              <a:t>Начинаем зачет</a:t>
+            </a:r>
+            <a:endParaRPr b="0" lang="ru-RU" sz="1800" spc="-1" strike="noStrike">
               <a:latin typeface="Arial"/>
             </a:endParaRPr>
           </a:p>
@@ -2728,13 +2757,13 @@
       </p:grpSpPr>
       <p:sp>
         <p:nvSpPr>
-          <p:cNvPr id="71" name="CustomShape 1"/>
+          <p:cNvPr id="72" name="CustomShape 1"/>
           <p:cNvSpPr/>
           <p:nvPr/>
         </p:nvSpPr>
         <p:spPr>
           <a:xfrm>
-            <a:off x="576000" y="1800000"/>
+            <a:off x="578160" y="34560"/>
             <a:ext cx="10797480" cy="1261080"/>
           </a:xfrm>
           <a:prstGeom prst="rect">
@@ -2763,9 +2792,344 @@
               <a:rPr b="0" lang="ru-RU" sz="4400" spc="-1" strike="noStrike">
                 <a:latin typeface="Arial"/>
               </a:rPr>
-              <a:t>Спасибо за внимание!</a:t>
+              <a:t>Лекции</a:t>
             </a:r>
             <a:endParaRPr b="0" lang="ru-RU" sz="4400" spc="-1" strike="noStrike">
+              <a:latin typeface="Arial"/>
+            </a:endParaRPr>
+          </a:p>
+        </p:txBody>
+      </p:sp>
+      <p:sp>
+        <p:nvSpPr>
+          <p:cNvPr id="73" name="CustomShape 2"/>
+          <p:cNvSpPr/>
+          <p:nvPr/>
+        </p:nvSpPr>
+        <p:spPr>
+          <a:xfrm>
+            <a:off x="578160" y="921600"/>
+            <a:ext cx="6800760" cy="3774960"/>
+          </a:xfrm>
+          <a:prstGeom prst="rect">
+            <a:avLst/>
+          </a:prstGeom>
+          <a:noFill/>
+          <a:ln>
+            <a:noFill/>
+          </a:ln>
+        </p:spPr>
+        <p:style>
+          <a:lnRef idx="0"/>
+          <a:fillRef idx="0"/>
+          <a:effectRef idx="0"/>
+          <a:fontRef idx="minor"/>
+        </p:style>
+      </p:sp>
+      <p:sp>
+        <p:nvSpPr>
+          <p:cNvPr id="74" name="CustomShape 3"/>
+          <p:cNvSpPr/>
+          <p:nvPr/>
+        </p:nvSpPr>
+        <p:spPr>
+          <a:xfrm>
+            <a:off x="360000" y="5400000"/>
+            <a:ext cx="10797480" cy="1261080"/>
+          </a:xfrm>
+          <a:prstGeom prst="rect">
+            <a:avLst/>
+          </a:prstGeom>
+          <a:noFill/>
+          <a:ln>
+            <a:noFill/>
+          </a:ln>
+        </p:spPr>
+        <p:style>
+          <a:lnRef idx="0"/>
+          <a:fillRef idx="0"/>
+          <a:effectRef idx="0"/>
+          <a:fontRef idx="minor"/>
+        </p:style>
+        <p:txBody>
+          <a:bodyPr lIns="0" rIns="0" tIns="0" bIns="0" anchor="ctr"/>
+          <a:p>
+            <a:r>
+              <a:rPr b="0" lang="ru-RU" sz="2800" spc="-1" strike="noStrike">
+                <a:latin typeface="Arial"/>
+              </a:rPr>
+              <a:t>Основы разработки корпоративных систем на платформе .NET</a:t>
+            </a:r>
+            <a:endParaRPr b="0" lang="ru-RU" sz="2800" spc="-1" strike="noStrike">
+              <a:latin typeface="Arial"/>
+            </a:endParaRPr>
+          </a:p>
+        </p:txBody>
+      </p:sp>
+      <p:sp>
+        <p:nvSpPr>
+          <p:cNvPr id="75" name="TextShape 4"/>
+          <p:cNvSpPr txBox="1"/>
+          <p:nvPr/>
+        </p:nvSpPr>
+        <p:spPr>
+          <a:xfrm>
+            <a:off x="1996200" y="1440000"/>
+            <a:ext cx="8731800" cy="3730320"/>
+          </a:xfrm>
+          <a:prstGeom prst="rect">
+            <a:avLst/>
+          </a:prstGeom>
+          <a:noFill/>
+          <a:ln>
+            <a:noFill/>
+          </a:ln>
+        </p:spPr>
+        <p:txBody>
+          <a:bodyPr lIns="90000" rIns="90000" tIns="45000" bIns="45000"/>
+          <a:p>
+            <a:pPr>
+              <a:lnSpc>
+                <a:spcPct val="150000"/>
+              </a:lnSpc>
+            </a:pPr>
+            <a:r>
+              <a:rPr b="0" lang="ru-RU" sz="1800" spc="-1" strike="noStrike">
+                <a:latin typeface="Arial"/>
+              </a:rPr>
+              <a:t>14.02</a:t>
+            </a:r>
+            <a:r>
+              <a:rPr b="0" lang="ru-RU" sz="1800" spc="-1" strike="noStrike">
+                <a:latin typeface="Arial"/>
+              </a:rPr>
+              <a:t>	</a:t>
+            </a:r>
+            <a:r>
+              <a:rPr b="0" lang="ru-RU" sz="1800" spc="-1" strike="noStrike">
+                <a:latin typeface="Arial"/>
+              </a:rPr>
+              <a:t>Тестовое задание на базовый уровень (3 простых задачи) </a:t>
+            </a:r>
+            <a:endParaRPr b="0" lang="ru-RU" sz="1800" spc="-1" strike="noStrike">
+              <a:latin typeface="Arial"/>
+            </a:endParaRPr>
+          </a:p>
+          <a:p>
+            <a:pPr>
+              <a:lnSpc>
+                <a:spcPct val="150000"/>
+              </a:lnSpc>
+            </a:pPr>
+            <a:r>
+              <a:rPr b="0" lang="ru-RU" sz="1800" spc="-1" strike="noStrike">
+                <a:latin typeface="Arial"/>
+              </a:rPr>
+              <a:t>21.02</a:t>
+            </a:r>
+            <a:r>
+              <a:rPr b="0" lang="ru-RU" sz="1800" spc="-1" strike="noStrike">
+                <a:latin typeface="Arial"/>
+              </a:rPr>
+              <a:t>	</a:t>
+            </a:r>
+            <a:r>
+              <a:rPr b="0" lang="ru-RU" sz="1800" spc="-1" strike="noStrike">
+                <a:latin typeface="Arial"/>
+              </a:rPr>
+              <a:t>Разработка бизнес-логики клиент-серверного приложения </a:t>
+            </a:r>
+            <a:endParaRPr b="0" lang="ru-RU" sz="1800" spc="-1" strike="noStrike">
+              <a:latin typeface="Arial"/>
+            </a:endParaRPr>
+          </a:p>
+          <a:p>
+            <a:pPr>
+              <a:lnSpc>
+                <a:spcPct val="150000"/>
+              </a:lnSpc>
+            </a:pPr>
+            <a:r>
+              <a:rPr b="0" lang="ru-RU" sz="1800" spc="-1" strike="noStrike">
+                <a:latin typeface="Arial"/>
+              </a:rPr>
+              <a:t>28.02</a:t>
+            </a:r>
+            <a:r>
+              <a:rPr b="0" lang="ru-RU" sz="1800" spc="-1" strike="noStrike">
+                <a:latin typeface="Arial"/>
+              </a:rPr>
+              <a:t>	</a:t>
+            </a:r>
+            <a:r>
+              <a:rPr b="0" lang="ru-RU" sz="1800" spc="-1" strike="noStrike">
+                <a:latin typeface="Arial"/>
+              </a:rPr>
+              <a:t>Разработка слоя работы с БД </a:t>
+            </a:r>
+            <a:endParaRPr b="0" lang="ru-RU" sz="1800" spc="-1" strike="noStrike">
+              <a:latin typeface="Arial"/>
+            </a:endParaRPr>
+          </a:p>
+          <a:p>
+            <a:pPr>
+              <a:lnSpc>
+                <a:spcPct val="150000"/>
+              </a:lnSpc>
+            </a:pPr>
+            <a:r>
+              <a:rPr b="0" lang="ru-RU" sz="1800" spc="-1" strike="noStrike">
+                <a:latin typeface="Arial"/>
+              </a:rPr>
+              <a:t>6.03</a:t>
+            </a:r>
+            <a:r>
+              <a:rPr b="0" lang="ru-RU" sz="1800" spc="-1" strike="noStrike">
+                <a:latin typeface="Arial"/>
+              </a:rPr>
+              <a:t>	</a:t>
+            </a:r>
+            <a:r>
+              <a:rPr b="0" lang="ru-RU" sz="1800" spc="-1" strike="noStrike">
+                <a:latin typeface="Arial"/>
+              </a:rPr>
+              <a:t>	</a:t>
+            </a:r>
+            <a:r>
+              <a:rPr b="0" lang="ru-RU" sz="1800" spc="-1" strike="noStrike">
+                <a:latin typeface="Arial"/>
+              </a:rPr>
+              <a:t>Разработка Web API сервисов </a:t>
+            </a:r>
+            <a:endParaRPr b="0" lang="ru-RU" sz="1800" spc="-1" strike="noStrike">
+              <a:latin typeface="Arial"/>
+            </a:endParaRPr>
+          </a:p>
+          <a:p>
+            <a:pPr>
+              <a:lnSpc>
+                <a:spcPct val="150000"/>
+              </a:lnSpc>
+            </a:pPr>
+            <a:r>
+              <a:rPr b="0" lang="ru-RU" sz="1800" spc="-1" strike="noStrike">
+                <a:latin typeface="Arial"/>
+              </a:rPr>
+              <a:t>13.03</a:t>
+            </a:r>
+            <a:r>
+              <a:rPr b="0" lang="ru-RU" sz="1800" spc="-1" strike="noStrike">
+                <a:latin typeface="Arial"/>
+              </a:rPr>
+              <a:t>	</a:t>
+            </a:r>
+            <a:r>
+              <a:rPr b="0" lang="ru-RU" sz="1800" spc="-1" strike="noStrike">
+                <a:latin typeface="Arial"/>
+              </a:rPr>
+              <a:t>Разработка Web API сервисов </a:t>
+            </a:r>
+            <a:endParaRPr b="0" lang="ru-RU" sz="1800" spc="-1" strike="noStrike">
+              <a:latin typeface="Arial"/>
+            </a:endParaRPr>
+          </a:p>
+          <a:p>
+            <a:pPr>
+              <a:lnSpc>
+                <a:spcPct val="150000"/>
+              </a:lnSpc>
+            </a:pPr>
+            <a:r>
+              <a:rPr b="0" lang="ru-RU" sz="1800" spc="-1" strike="noStrike">
+                <a:latin typeface="Arial"/>
+              </a:rPr>
+              <a:t>20.03</a:t>
+            </a:r>
+            <a:r>
+              <a:rPr b="0" lang="ru-RU" sz="1800" spc="-1" strike="noStrike">
+                <a:latin typeface="Arial"/>
+              </a:rPr>
+              <a:t>	</a:t>
+            </a:r>
+            <a:r>
+              <a:rPr b="0" lang="ru-RU" sz="1800" spc="-1" strike="noStrike">
+                <a:latin typeface="Arial"/>
+              </a:rPr>
+              <a:t>Разработка ASP.NET MVC приложения для работы с Web API </a:t>
+            </a:r>
+            <a:endParaRPr b="0" lang="ru-RU" sz="1800" spc="-1" strike="noStrike">
+              <a:latin typeface="Arial"/>
+            </a:endParaRPr>
+          </a:p>
+          <a:p>
+            <a:pPr>
+              <a:lnSpc>
+                <a:spcPct val="150000"/>
+              </a:lnSpc>
+            </a:pPr>
+            <a:r>
+              <a:rPr b="0" lang="ru-RU" sz="1800" spc="-1" strike="noStrike">
+                <a:latin typeface="Arial"/>
+              </a:rPr>
+              <a:t>27.03</a:t>
+            </a:r>
+            <a:r>
+              <a:rPr b="0" lang="ru-RU" sz="1800" spc="-1" strike="noStrike">
+                <a:latin typeface="Arial"/>
+              </a:rPr>
+              <a:t>	</a:t>
+            </a:r>
+            <a:r>
+              <a:rPr b="0" lang="ru-RU" sz="1800" spc="-1" strike="noStrike">
+                <a:latin typeface="Arial"/>
+              </a:rPr>
+              <a:t>Разработка ASP.NET MVC приложения для работы с Web API </a:t>
+            </a:r>
+            <a:endParaRPr b="0" lang="ru-RU" sz="1800" spc="-1" strike="noStrike">
+              <a:latin typeface="Arial"/>
+            </a:endParaRPr>
+          </a:p>
+          <a:p>
+            <a:pPr>
+              <a:lnSpc>
+                <a:spcPct val="150000"/>
+              </a:lnSpc>
+            </a:pPr>
+            <a:r>
+              <a:rPr b="0" lang="ru-RU" sz="1800" spc="-1" strike="noStrike">
+                <a:latin typeface="Arial"/>
+              </a:rPr>
+              <a:t>3.04</a:t>
+            </a:r>
+            <a:r>
+              <a:rPr b="0" lang="ru-RU" sz="1800" spc="-1" strike="noStrike">
+                <a:latin typeface="Arial"/>
+              </a:rPr>
+              <a:t>	</a:t>
+            </a:r>
+            <a:r>
+              <a:rPr b="0" lang="ru-RU" sz="1800" spc="-1" strike="noStrike">
+                <a:latin typeface="Arial"/>
+              </a:rPr>
+              <a:t>	</a:t>
+            </a:r>
+            <a:r>
+              <a:rPr b="0" lang="ru-RU" sz="1800" spc="-1" strike="noStrike">
+                <a:latin typeface="Arial"/>
+              </a:rPr>
+              <a:t>Сдаем практику</a:t>
+            </a:r>
+            <a:endParaRPr b="0" lang="ru-RU" sz="1800" spc="-1" strike="noStrike">
+              <a:latin typeface="Arial"/>
+            </a:endParaRPr>
+          </a:p>
+          <a:p>
+            <a:pPr>
+              <a:lnSpc>
+                <a:spcPct val="150000"/>
+              </a:lnSpc>
+            </a:pPr>
+            <a:endParaRPr b="0" lang="ru-RU" sz="1800" spc="-1" strike="noStrike">
               <a:latin typeface="Arial"/>
             </a:endParaRPr>
           </a:p>
@@ -2780,6 +3144,560 @@
           <p:childTnLst>
             <p:seq>
               <p:cTn id="24" dur="indefinite" nodeType="mainSeq"/>
+              <p:prevCondLst>
+                <p:cond delay="0" evt="onPrev">
+                  <p:tgtEl>
+                    <p:sldTgt/>
+                  </p:tgtEl>
+                </p:cond>
+              </p:prevCondLst>
+              <p:nextCondLst>
+                <p:cond delay="0" evt="onNext">
+                  <p:tgtEl>
+                    <p:sldTgt/>
+                  </p:tgtEl>
+                </p:cond>
+              </p:nextCondLst>
+            </p:seq>
+          </p:childTnLst>
+        </p:cTn>
+      </p:par>
+    </p:tnLst>
+  </p:timing>
+</p:sld>
+</file>
+
+<file path=ppt/slides/slide13.xml><?xml version="1.0" encoding="utf-8"?>
+<p:sld xmlns:a="http://schemas.openxmlformats.org/drawingml/2006/main" xmlns:p="http://schemas.openxmlformats.org/presentationml/2006/main" xmlns:r="http://schemas.openxmlformats.org/officeDocument/2006/relationships" xmlns:p14="http://schemas.microsoft.com/office/powerpoint/2010/main" xmlns:p15="http://schemas.microsoft.com/office/powerpoint/2012/main" xmlns:mc="http://schemas.openxmlformats.org/markup-compatibility/2006">
+  <p:cSld>
+    <p:spTree>
+      <p:nvGrpSpPr>
+        <p:cNvPr id="1" name=""/>
+        <p:cNvGrpSpPr/>
+        <p:nvPr/>
+      </p:nvGrpSpPr>
+      <p:grpSpPr>
+        <a:xfrm>
+          <a:off x="0" y="0"/>
+          <a:ext cx="0" cy="0"/>
+          <a:chOff x="0" y="0"/>
+          <a:chExt cx="0" cy="0"/>
+        </a:xfrm>
+      </p:grpSpPr>
+      <p:sp>
+        <p:nvSpPr>
+          <p:cNvPr id="76" name="CustomShape 1"/>
+          <p:cNvSpPr/>
+          <p:nvPr/>
+        </p:nvSpPr>
+        <p:spPr>
+          <a:xfrm>
+            <a:off x="578160" y="34560"/>
+            <a:ext cx="10797480" cy="1261080"/>
+          </a:xfrm>
+          <a:prstGeom prst="rect">
+            <a:avLst/>
+          </a:prstGeom>
+          <a:noFill/>
+          <a:ln>
+            <a:noFill/>
+          </a:ln>
+        </p:spPr>
+        <p:style>
+          <a:lnRef idx="0"/>
+          <a:fillRef idx="0"/>
+          <a:effectRef idx="0"/>
+          <a:fontRef idx="minor"/>
+        </p:style>
+        <p:txBody>
+          <a:bodyPr lIns="0" rIns="0" tIns="0" bIns="0" anchor="ctr"/>
+          <a:p>
+            <a:pPr algn="ctr">
+              <a:lnSpc>
+                <a:spcPct val="100000"/>
+              </a:lnSpc>
+            </a:pPr>
+            <a:r>
+              <a:rPr b="0" lang="ru-RU" sz="4400" spc="-1" strike="noStrike">
+                <a:latin typeface="Arial"/>
+              </a:rPr>
+              <a:t>Домашнее задание</a:t>
+            </a:r>
+            <a:endParaRPr b="0" lang="ru-RU" sz="4400" spc="-1" strike="noStrike">
+              <a:latin typeface="Arial"/>
+            </a:endParaRPr>
+          </a:p>
+        </p:txBody>
+      </p:sp>
+      <p:sp>
+        <p:nvSpPr>
+          <p:cNvPr id="77" name="CustomShape 2"/>
+          <p:cNvSpPr/>
+          <p:nvPr/>
+        </p:nvSpPr>
+        <p:spPr>
+          <a:xfrm>
+            <a:off x="360000" y="5400000"/>
+            <a:ext cx="10797480" cy="1261080"/>
+          </a:xfrm>
+          <a:prstGeom prst="rect">
+            <a:avLst/>
+          </a:prstGeom>
+          <a:noFill/>
+          <a:ln>
+            <a:noFill/>
+          </a:ln>
+        </p:spPr>
+        <p:style>
+          <a:lnRef idx="0"/>
+          <a:fillRef idx="0"/>
+          <a:effectRef idx="0"/>
+          <a:fontRef idx="minor"/>
+        </p:style>
+        <p:txBody>
+          <a:bodyPr lIns="0" rIns="0" tIns="0" bIns="0" anchor="ctr"/>
+          <a:p>
+            <a:r>
+              <a:rPr b="0" lang="ru-RU" sz="2800" spc="-1" strike="noStrike">
+                <a:latin typeface="Arial"/>
+              </a:rPr>
+              <a:t>Основы разработки корпоративных систем на платформе .NET</a:t>
+            </a:r>
+            <a:endParaRPr b="0" lang="ru-RU" sz="2800" spc="-1" strike="noStrike">
+              <a:latin typeface="Arial"/>
+            </a:endParaRPr>
+          </a:p>
+        </p:txBody>
+      </p:sp>
+      <p:sp>
+        <p:nvSpPr>
+          <p:cNvPr id="78" name="CustomShape 3"/>
+          <p:cNvSpPr/>
+          <p:nvPr/>
+        </p:nvSpPr>
+        <p:spPr>
+          <a:xfrm>
+            <a:off x="802080" y="1008000"/>
+            <a:ext cx="6469920" cy="3795840"/>
+          </a:xfrm>
+          <a:prstGeom prst="rect">
+            <a:avLst/>
+          </a:prstGeom>
+          <a:noFill/>
+          <a:ln>
+            <a:noFill/>
+          </a:ln>
+        </p:spPr>
+        <p:style>
+          <a:lnRef idx="0"/>
+          <a:fillRef idx="0"/>
+          <a:effectRef idx="0"/>
+          <a:fontRef idx="minor"/>
+        </p:style>
+        <p:txBody>
+          <a:bodyPr lIns="90000" rIns="90000" tIns="45000" bIns="45000"/>
+          <a:p>
+            <a:pPr marL="216000" indent="-215640">
+              <a:lnSpc>
+                <a:spcPct val="100000"/>
+              </a:lnSpc>
+              <a:spcBef>
+                <a:spcPts val="451"/>
+              </a:spcBef>
+              <a:spcAft>
+                <a:spcPts val="451"/>
+              </a:spcAft>
+              <a:buClr>
+                <a:srgbClr val="000000"/>
+              </a:buClr>
+              <a:buSzPct val="45000"/>
+              <a:buFont typeface="Wingdings" charset="2"/>
+              <a:buChar char=""/>
+            </a:pPr>
+            <a:r>
+              <a:rPr b="0" lang="ru-RU" sz="1500" spc="-1" strike="noStrike">
+                <a:solidFill>
+                  <a:srgbClr val="000000"/>
+                </a:solidFill>
+                <a:latin typeface="Open Sans"/>
+              </a:rPr>
+              <a:t>Создать проект (Agile/Git) на visualstudio.com</a:t>
+            </a:r>
+            <a:endParaRPr b="0" lang="ru-RU" sz="1500" spc="-1" strike="noStrike">
+              <a:latin typeface="Arial"/>
+            </a:endParaRPr>
+          </a:p>
+          <a:p>
+            <a:pPr marL="216000" indent="-215640">
+              <a:lnSpc>
+                <a:spcPct val="100000"/>
+              </a:lnSpc>
+              <a:spcBef>
+                <a:spcPts val="451"/>
+              </a:spcBef>
+              <a:spcAft>
+                <a:spcPts val="451"/>
+              </a:spcAft>
+              <a:buClr>
+                <a:srgbClr val="000000"/>
+              </a:buClr>
+              <a:buSzPct val="45000"/>
+              <a:buFont typeface="Wingdings" charset="2"/>
+              <a:buChar char=""/>
+            </a:pPr>
+            <a:r>
+              <a:rPr b="0" lang="ru-RU" sz="1500" spc="-1" strike="noStrike">
+                <a:solidFill>
+                  <a:srgbClr val="000000"/>
+                </a:solidFill>
+                <a:latin typeface="Open Sans"/>
+              </a:rPr>
+              <a:t>(Для домашних заданий) Установить себе:</a:t>
+            </a:r>
+            <a:endParaRPr b="0" lang="ru-RU" sz="1500" spc="-1" strike="noStrike">
+              <a:latin typeface="Arial"/>
+            </a:endParaRPr>
+          </a:p>
+          <a:p>
+            <a:pPr marL="216000" indent="-215640">
+              <a:lnSpc>
+                <a:spcPct val="100000"/>
+              </a:lnSpc>
+              <a:spcBef>
+                <a:spcPts val="451"/>
+              </a:spcBef>
+              <a:spcAft>
+                <a:spcPts val="451"/>
+              </a:spcAft>
+              <a:buClr>
+                <a:srgbClr val="000000"/>
+              </a:buClr>
+              <a:buFont typeface="StarSymbol"/>
+              <a:buAutoNum type="arabicParenR"/>
+            </a:pPr>
+            <a:r>
+              <a:rPr b="0" lang="ru-RU" sz="1400" spc="-1" strike="noStrike">
+                <a:solidFill>
+                  <a:srgbClr val="000000"/>
+                </a:solidFill>
+                <a:latin typeface="Open Sans"/>
+              </a:rPr>
+              <a:t>VS 2017 Community Edition</a:t>
+            </a:r>
+            <a:endParaRPr b="0" lang="ru-RU" sz="1400" spc="-1" strike="noStrike">
+              <a:latin typeface="Arial"/>
+            </a:endParaRPr>
+          </a:p>
+          <a:p>
+            <a:pPr marL="216000" indent="-215640">
+              <a:lnSpc>
+                <a:spcPct val="100000"/>
+              </a:lnSpc>
+              <a:spcBef>
+                <a:spcPts val="451"/>
+              </a:spcBef>
+              <a:spcAft>
+                <a:spcPts val="451"/>
+              </a:spcAft>
+              <a:buClr>
+                <a:srgbClr val="000000"/>
+              </a:buClr>
+              <a:buFont typeface="StarSymbol"/>
+              <a:buAutoNum type="arabicParenR"/>
+            </a:pPr>
+            <a:r>
+              <a:rPr b="0" lang="ru-RU" sz="1400" spc="-1" strike="noStrike">
+                <a:solidFill>
+                  <a:srgbClr val="000000"/>
+                </a:solidFill>
+                <a:latin typeface="Open Sans"/>
+              </a:rPr>
+              <a:t>ReSharper и получить на него студенческую лицензию</a:t>
+            </a:r>
+            <a:endParaRPr b="0" lang="ru-RU" sz="1400" spc="-1" strike="noStrike">
+              <a:latin typeface="Arial"/>
+            </a:endParaRPr>
+          </a:p>
+          <a:p>
+            <a:pPr marL="216000" indent="-215640">
+              <a:lnSpc>
+                <a:spcPct val="100000"/>
+              </a:lnSpc>
+              <a:spcBef>
+                <a:spcPts val="451"/>
+              </a:spcBef>
+              <a:spcAft>
+                <a:spcPts val="451"/>
+              </a:spcAft>
+              <a:buClr>
+                <a:srgbClr val="000000"/>
+              </a:buClr>
+              <a:buFont typeface="StarSymbol"/>
+              <a:buAutoNum type="arabicParenR"/>
+            </a:pPr>
+            <a:r>
+              <a:rPr b="0" lang="ru-RU" sz="1400" spc="-1" strike="noStrike">
+                <a:solidFill>
+                  <a:srgbClr val="000000"/>
+                </a:solidFill>
+                <a:latin typeface="Open Sans"/>
+              </a:rPr>
+              <a:t>Git Extension</a:t>
+            </a:r>
+            <a:endParaRPr b="0" lang="ru-RU" sz="1400" spc="-1" strike="noStrike">
+              <a:latin typeface="Arial"/>
+            </a:endParaRPr>
+          </a:p>
+          <a:p>
+            <a:pPr marL="216000" indent="-215640">
+              <a:lnSpc>
+                <a:spcPct val="100000"/>
+              </a:lnSpc>
+              <a:spcBef>
+                <a:spcPts val="451"/>
+              </a:spcBef>
+              <a:spcAft>
+                <a:spcPts val="451"/>
+              </a:spcAft>
+              <a:buClr>
+                <a:srgbClr val="000000"/>
+              </a:buClr>
+              <a:buFont typeface="StarSymbol"/>
+              <a:buAutoNum type="arabicParenR"/>
+            </a:pPr>
+            <a:r>
+              <a:rPr b="0" lang="ru-RU" sz="1400" spc="-1" strike="noStrike">
+                <a:solidFill>
+                  <a:srgbClr val="000000"/>
+                </a:solidFill>
+                <a:latin typeface="Open Sans"/>
+              </a:rPr>
+              <a:t>Productivity Power Tools (по желанию)</a:t>
+            </a:r>
+            <a:endParaRPr b="0" lang="ru-RU" sz="1400" spc="-1" strike="noStrike">
+              <a:latin typeface="Arial"/>
+            </a:endParaRPr>
+          </a:p>
+          <a:p>
+            <a:pPr marL="216000" indent="-215640">
+              <a:lnSpc>
+                <a:spcPct val="100000"/>
+              </a:lnSpc>
+              <a:spcBef>
+                <a:spcPts val="451"/>
+              </a:spcBef>
+              <a:spcAft>
+                <a:spcPts val="451"/>
+              </a:spcAft>
+              <a:buClr>
+                <a:srgbClr val="000000"/>
+              </a:buClr>
+              <a:buSzPct val="45000"/>
+              <a:buFont typeface="Wingdings" charset="2"/>
+              <a:buChar char=""/>
+            </a:pPr>
+            <a:r>
+              <a:rPr b="0" lang="ru-RU" sz="1500" spc="-1" strike="noStrike">
+                <a:solidFill>
+                  <a:srgbClr val="000000"/>
+                </a:solidFill>
+                <a:latin typeface="Open Sans"/>
+              </a:rPr>
+              <a:t>Решить три простые задачи, решения залить в Git:</a:t>
+            </a:r>
+            <a:endParaRPr b="0" lang="ru-RU" sz="1500" spc="-1" strike="noStrike">
+              <a:latin typeface="Arial"/>
+            </a:endParaRPr>
+          </a:p>
+          <a:p>
+            <a:pPr marL="216000" indent="-215640">
+              <a:lnSpc>
+                <a:spcPct val="100000"/>
+              </a:lnSpc>
+              <a:spcBef>
+                <a:spcPts val="451"/>
+              </a:spcBef>
+              <a:spcAft>
+                <a:spcPts val="451"/>
+              </a:spcAft>
+              <a:buClr>
+                <a:srgbClr val="000000"/>
+              </a:buClr>
+              <a:buFont typeface="StarSymbol"/>
+              <a:buAutoNum type="arabicParenR"/>
+            </a:pPr>
+            <a:r>
+              <a:rPr b="0" lang="ru-RU" sz="1400" spc="-1" strike="noStrike">
+                <a:solidFill>
+                  <a:srgbClr val="000000"/>
+                </a:solidFill>
+                <a:latin typeface="Open Sans"/>
+              </a:rPr>
+              <a:t>Реализовать связный список: создание, удаление, добавление произвольных элементов, реверс списка - без использования стандартных коллекций/LINQ (только IEnumerable)</a:t>
+            </a:r>
+            <a:endParaRPr b="0" lang="ru-RU" sz="1400" spc="-1" strike="noStrike">
+              <a:latin typeface="Arial"/>
+            </a:endParaRPr>
+          </a:p>
+          <a:p>
+            <a:pPr marL="216000" indent="-215640">
+              <a:lnSpc>
+                <a:spcPct val="100000"/>
+              </a:lnSpc>
+              <a:spcBef>
+                <a:spcPts val="451"/>
+              </a:spcBef>
+              <a:spcAft>
+                <a:spcPts val="451"/>
+              </a:spcAft>
+              <a:buClr>
+                <a:srgbClr val="000000"/>
+              </a:buClr>
+              <a:buFont typeface="StarSymbol"/>
+              <a:buAutoNum type="arabicParenR"/>
+            </a:pPr>
+            <a:r>
+              <a:rPr b="0" lang="ru-RU" sz="1400" spc="-1" strike="noStrike">
+                <a:solidFill>
+                  <a:srgbClr val="000000"/>
+                </a:solidFill>
+                <a:latin typeface="Open Sans"/>
+              </a:rPr>
+              <a:t>Реализовать бинарное дерево: заполнение, поиск, удаление элемента - без использования стандартных деревьев</a:t>
+            </a:r>
+            <a:endParaRPr b="0" lang="ru-RU" sz="1400" spc="-1" strike="noStrike">
+              <a:latin typeface="Arial"/>
+            </a:endParaRPr>
+          </a:p>
+          <a:p>
+            <a:pPr marL="216000" indent="-215640">
+              <a:lnSpc>
+                <a:spcPct val="150000"/>
+              </a:lnSpc>
+              <a:buClr>
+                <a:srgbClr val="000000"/>
+              </a:buClr>
+              <a:buFont typeface="StarSymbol"/>
+              <a:buAutoNum type="arabicParenR"/>
+            </a:pPr>
+            <a:r>
+              <a:rPr b="0" lang="ru-RU" sz="1400" spc="-1" strike="noStrike">
+                <a:solidFill>
+                  <a:srgbClr val="000000"/>
+                </a:solidFill>
+                <a:latin typeface="Open Sans"/>
+              </a:rPr>
+              <a:t>Реализовать сортировку вставками - без .OrderBy() :)</a:t>
+            </a:r>
+            <a:endParaRPr b="0" lang="ru-RU" sz="1400" spc="-1" strike="noStrike">
+              <a:latin typeface="Arial"/>
+            </a:endParaRPr>
+          </a:p>
+        </p:txBody>
+      </p:sp>
+    </p:spTree>
+  </p:cSld>
+  <p:timing>
+    <p:tnLst>
+      <p:par>
+        <p:cTn id="25" dur="indefinite" restart="never" nodeType="tmRoot">
+          <p:childTnLst>
+            <p:seq>
+              <p:cTn id="26" dur="indefinite" nodeType="mainSeq"/>
+              <p:prevCondLst>
+                <p:cond delay="0" evt="onPrev">
+                  <p:tgtEl>
+                    <p:sldTgt/>
+                  </p:tgtEl>
+                </p:cond>
+              </p:prevCondLst>
+              <p:nextCondLst>
+                <p:cond delay="0" evt="onNext">
+                  <p:tgtEl>
+                    <p:sldTgt/>
+                  </p:tgtEl>
+                </p:cond>
+              </p:nextCondLst>
+            </p:seq>
+          </p:childTnLst>
+        </p:cTn>
+      </p:par>
+    </p:tnLst>
+  </p:timing>
+</p:sld>
+</file>
+
+<file path=ppt/slides/slide14.xml><?xml version="1.0" encoding="utf-8"?>
+<p:sld xmlns:a="http://schemas.openxmlformats.org/drawingml/2006/main" xmlns:p="http://schemas.openxmlformats.org/presentationml/2006/main" xmlns:r="http://schemas.openxmlformats.org/officeDocument/2006/relationships" xmlns:p14="http://schemas.microsoft.com/office/powerpoint/2010/main" xmlns:p15="http://schemas.microsoft.com/office/powerpoint/2012/main" xmlns:mc="http://schemas.openxmlformats.org/markup-compatibility/2006">
+  <p:cSld>
+    <p:spTree>
+      <p:nvGrpSpPr>
+        <p:cNvPr id="1" name=""/>
+        <p:cNvGrpSpPr/>
+        <p:nvPr/>
+      </p:nvGrpSpPr>
+      <p:grpSpPr>
+        <a:xfrm>
+          <a:off x="0" y="0"/>
+          <a:ext cx="0" cy="0"/>
+          <a:chOff x="0" y="0"/>
+          <a:chExt cx="0" cy="0"/>
+        </a:xfrm>
+      </p:grpSpPr>
+      <p:sp>
+        <p:nvSpPr>
+          <p:cNvPr id="79" name="CustomShape 1"/>
+          <p:cNvSpPr/>
+          <p:nvPr/>
+        </p:nvSpPr>
+        <p:spPr>
+          <a:xfrm>
+            <a:off x="576000" y="1800000"/>
+            <a:ext cx="10797480" cy="1261080"/>
+          </a:xfrm>
+          <a:prstGeom prst="rect">
+            <a:avLst/>
+          </a:prstGeom>
+          <a:noFill/>
+          <a:ln>
+            <a:noFill/>
+          </a:ln>
+        </p:spPr>
+        <p:style>
+          <a:lnRef idx="0"/>
+          <a:fillRef idx="0"/>
+          <a:effectRef idx="0"/>
+          <a:fontRef idx="minor"/>
+        </p:style>
+        <p:txBody>
+          <a:bodyPr lIns="0" rIns="0" tIns="0" bIns="0" anchor="ctr"/>
+          <a:p>
+            <a:pPr algn="ctr">
+              <a:lnSpc>
+                <a:spcPct val="100000"/>
+              </a:lnSpc>
+            </a:pPr>
+            <a:r>
+              <a:rPr b="0" lang="ru-RU" sz="4400" spc="-1" strike="noStrike">
+                <a:latin typeface="Arial"/>
+              </a:rPr>
+              <a:t>Спасибо за внимание!</a:t>
+            </a:r>
+            <a:endParaRPr b="0" lang="ru-RU" sz="4400" spc="-1" strike="noStrike">
+              <a:latin typeface="Arial"/>
+            </a:endParaRPr>
+          </a:p>
+        </p:txBody>
+      </p:sp>
+    </p:spTree>
+  </p:cSld>
+  <p:timing>
+    <p:tnLst>
+      <p:par>
+        <p:cTn id="27" dur="indefinite" restart="never" nodeType="tmRoot">
+          <p:childTnLst>
+            <p:seq>
+              <p:cTn id="28" dur="indefinite" nodeType="mainSeq"/>
               <p:prevCondLst>
                 <p:cond delay="0" evt="onPrev">
                   <p:tgtEl>

</xml_diff>